<commit_message>
started adding hypothesis + modified margin
</commit_message>
<xml_diff>
--- a/Fig/Intro/Intro_Problematics/Intro_Problematics.pptx
+++ b/Fig/Intro/Intro_Problematics/Intro_Problematics.pptx
@@ -2,11 +2,13 @@
 <file path=ppt/presentation.xml><?xml version="1.0" encoding="utf-8"?>
 <p:presentation xmlns:a="http://schemas.openxmlformats.org/drawingml/2006/main" xmlns:r="http://schemas.openxmlformats.org/officeDocument/2006/relationships" xmlns:p="http://schemas.openxmlformats.org/presentationml/2006/main" saveSubsetFonts="1">
   <p:sldMasterIdLst>
-    <p:sldMasterId id="2147483684" r:id="rId1"/>
+    <p:sldMasterId id="2147483708" r:id="rId1"/>
   </p:sldMasterIdLst>
   <p:sldIdLst>
-    <p:sldId id="259" r:id="rId2"/>
-    <p:sldId id="258" r:id="rId3"/>
+    <p:sldId id="261" r:id="rId2"/>
+    <p:sldId id="259" r:id="rId3"/>
+    <p:sldId id="260" r:id="rId4"/>
+    <p:sldId id="258" r:id="rId5"/>
   </p:sldIdLst>
   <p:sldSz cx="6858000" cy="5040313"/>
   <p:notesSz cx="6858000" cy="9144000"/>
@@ -113,7 +115,7 @@
             <a:srgbClr val="A4A3A4"/>
           </p15:clr>
         </p15:guide>
-        <p15:guide id="2" pos="2160">
+        <p15:guide id="2" pos="4088" userDrawn="1">
           <p15:clr>
             <a:srgbClr val="A4A3A4"/>
           </p15:clr>
@@ -306,7 +308,7 @@
     </p:spTree>
     <p:extLst>
       <p:ext uri="{BB962C8B-B14F-4D97-AF65-F5344CB8AC3E}">
-        <p14:creationId xmlns:p14="http://schemas.microsoft.com/office/powerpoint/2010/main" val="1451580475"/>
+        <p14:creationId xmlns:p14="http://schemas.microsoft.com/office/powerpoint/2010/main" val="2093426505"/>
       </p:ext>
     </p:extLst>
   </p:cSld>
@@ -476,7 +478,7 @@
     </p:spTree>
     <p:extLst>
       <p:ext uri="{BB962C8B-B14F-4D97-AF65-F5344CB8AC3E}">
-        <p14:creationId xmlns:p14="http://schemas.microsoft.com/office/powerpoint/2010/main" val="6283345"/>
+        <p14:creationId xmlns:p14="http://schemas.microsoft.com/office/powerpoint/2010/main" val="1812756082"/>
       </p:ext>
     </p:extLst>
   </p:cSld>
@@ -656,7 +658,7 @@
     </p:spTree>
     <p:extLst>
       <p:ext uri="{BB962C8B-B14F-4D97-AF65-F5344CB8AC3E}">
-        <p14:creationId xmlns:p14="http://schemas.microsoft.com/office/powerpoint/2010/main" val="2364305750"/>
+        <p14:creationId xmlns:p14="http://schemas.microsoft.com/office/powerpoint/2010/main" val="2699970945"/>
       </p:ext>
     </p:extLst>
   </p:cSld>
@@ -826,7 +828,7 @@
     </p:spTree>
     <p:extLst>
       <p:ext uri="{BB962C8B-B14F-4D97-AF65-F5344CB8AC3E}">
-        <p14:creationId xmlns:p14="http://schemas.microsoft.com/office/powerpoint/2010/main" val="3287734882"/>
+        <p14:creationId xmlns:p14="http://schemas.microsoft.com/office/powerpoint/2010/main" val="1746285597"/>
       </p:ext>
     </p:extLst>
   </p:cSld>
@@ -1070,7 +1072,7 @@
     </p:spTree>
     <p:extLst>
       <p:ext uri="{BB962C8B-B14F-4D97-AF65-F5344CB8AC3E}">
-        <p14:creationId xmlns:p14="http://schemas.microsoft.com/office/powerpoint/2010/main" val="2125806717"/>
+        <p14:creationId xmlns:p14="http://schemas.microsoft.com/office/powerpoint/2010/main" val="3062569250"/>
       </p:ext>
     </p:extLst>
   </p:cSld>
@@ -1302,7 +1304,7 @@
     </p:spTree>
     <p:extLst>
       <p:ext uri="{BB962C8B-B14F-4D97-AF65-F5344CB8AC3E}">
-        <p14:creationId xmlns:p14="http://schemas.microsoft.com/office/powerpoint/2010/main" val="4004595528"/>
+        <p14:creationId xmlns:p14="http://schemas.microsoft.com/office/powerpoint/2010/main" val="1771701696"/>
       </p:ext>
     </p:extLst>
   </p:cSld>
@@ -1669,7 +1671,7 @@
     </p:spTree>
     <p:extLst>
       <p:ext uri="{BB962C8B-B14F-4D97-AF65-F5344CB8AC3E}">
-        <p14:creationId xmlns:p14="http://schemas.microsoft.com/office/powerpoint/2010/main" val="3034919969"/>
+        <p14:creationId xmlns:p14="http://schemas.microsoft.com/office/powerpoint/2010/main" val="638325962"/>
       </p:ext>
     </p:extLst>
   </p:cSld>
@@ -1787,7 +1789,7 @@
     </p:spTree>
     <p:extLst>
       <p:ext uri="{BB962C8B-B14F-4D97-AF65-F5344CB8AC3E}">
-        <p14:creationId xmlns:p14="http://schemas.microsoft.com/office/powerpoint/2010/main" val="381446625"/>
+        <p14:creationId xmlns:p14="http://schemas.microsoft.com/office/powerpoint/2010/main" val="43141604"/>
       </p:ext>
     </p:extLst>
   </p:cSld>
@@ -1882,7 +1884,7 @@
     </p:spTree>
     <p:extLst>
       <p:ext uri="{BB962C8B-B14F-4D97-AF65-F5344CB8AC3E}">
-        <p14:creationId xmlns:p14="http://schemas.microsoft.com/office/powerpoint/2010/main" val="2019869764"/>
+        <p14:creationId xmlns:p14="http://schemas.microsoft.com/office/powerpoint/2010/main" val="1627408822"/>
       </p:ext>
     </p:extLst>
   </p:cSld>
@@ -2159,7 +2161,7 @@
     </p:spTree>
     <p:extLst>
       <p:ext uri="{BB962C8B-B14F-4D97-AF65-F5344CB8AC3E}">
-        <p14:creationId xmlns:p14="http://schemas.microsoft.com/office/powerpoint/2010/main" val="3829767038"/>
+        <p14:creationId xmlns:p14="http://schemas.microsoft.com/office/powerpoint/2010/main" val="862710337"/>
       </p:ext>
     </p:extLst>
   </p:cSld>
@@ -2416,7 +2418,7 @@
     </p:spTree>
     <p:extLst>
       <p:ext uri="{BB962C8B-B14F-4D97-AF65-F5344CB8AC3E}">
-        <p14:creationId xmlns:p14="http://schemas.microsoft.com/office/powerpoint/2010/main" val="2485672417"/>
+        <p14:creationId xmlns:p14="http://schemas.microsoft.com/office/powerpoint/2010/main" val="1533276195"/>
       </p:ext>
     </p:extLst>
   </p:cSld>
@@ -2665,23 +2667,23 @@
     </p:spTree>
     <p:extLst>
       <p:ext uri="{BB962C8B-B14F-4D97-AF65-F5344CB8AC3E}">
-        <p14:creationId xmlns:p14="http://schemas.microsoft.com/office/powerpoint/2010/main" val="2761665224"/>
+        <p14:creationId xmlns:p14="http://schemas.microsoft.com/office/powerpoint/2010/main" val="1022314637"/>
       </p:ext>
     </p:extLst>
   </p:cSld>
   <p:clrMap bg1="lt1" tx1="dk1" bg2="lt2" tx2="dk2" accent1="accent1" accent2="accent2" accent3="accent3" accent4="accent4" accent5="accent5" accent6="accent6" hlink="hlink" folHlink="folHlink"/>
   <p:sldLayoutIdLst>
-    <p:sldLayoutId id="2147483685" r:id="rId1"/>
-    <p:sldLayoutId id="2147483686" r:id="rId2"/>
-    <p:sldLayoutId id="2147483687" r:id="rId3"/>
-    <p:sldLayoutId id="2147483688" r:id="rId4"/>
-    <p:sldLayoutId id="2147483689" r:id="rId5"/>
-    <p:sldLayoutId id="2147483690" r:id="rId6"/>
-    <p:sldLayoutId id="2147483691" r:id="rId7"/>
-    <p:sldLayoutId id="2147483692" r:id="rId8"/>
-    <p:sldLayoutId id="2147483693" r:id="rId9"/>
-    <p:sldLayoutId id="2147483694" r:id="rId10"/>
-    <p:sldLayoutId id="2147483695" r:id="rId11"/>
+    <p:sldLayoutId id="2147483709" r:id="rId1"/>
+    <p:sldLayoutId id="2147483710" r:id="rId2"/>
+    <p:sldLayoutId id="2147483711" r:id="rId3"/>
+    <p:sldLayoutId id="2147483712" r:id="rId4"/>
+    <p:sldLayoutId id="2147483713" r:id="rId5"/>
+    <p:sldLayoutId id="2147483714" r:id="rId6"/>
+    <p:sldLayoutId id="2147483715" r:id="rId7"/>
+    <p:sldLayoutId id="2147483716" r:id="rId8"/>
+    <p:sldLayoutId id="2147483717" r:id="rId9"/>
+    <p:sldLayoutId id="2147483718" r:id="rId10"/>
+    <p:sldLayoutId id="2147483719" r:id="rId11"/>
   </p:sldLayoutIdLst>
   <p:txStyles>
     <p:titleStyle>
@@ -2985,7 +2987,7 @@
       </p:grpSpPr>
       <p:sp>
         <p:nvSpPr>
-          <p:cNvPr id="3" name="Rectangle 2"/>
+          <p:cNvPr id="3" name="Rectangle à coins arrondis 2"/>
           <p:cNvSpPr/>
           <p:nvPr/>
         </p:nvSpPr>
@@ -2994,8 +2996,993 @@
             <a:off x="66054" y="359348"/>
             <a:ext cx="532801" cy="4311161"/>
           </a:xfrm>
+          <a:prstGeom prst="roundRect">
+            <a:avLst>
+              <a:gd name="adj" fmla="val 10645"/>
+            </a:avLst>
+          </a:prstGeom>
+          <a:solidFill>
+            <a:srgbClr val="F3F3FA"/>
+          </a:solidFill>
+          <a:ln>
+            <a:noFill/>
+          </a:ln>
+          <a:effectLst>
+            <a:outerShdw blurRad="25400" dist="25400" dir="2700000" algn="tl" rotWithShape="0">
+              <a:schemeClr val="tx1">
+                <a:lumMod val="50000"/>
+                <a:lumOff val="50000"/>
+                <a:alpha val="70000"/>
+              </a:schemeClr>
+            </a:outerShdw>
+          </a:effectLst>
+        </p:spPr>
+        <p:style>
+          <a:lnRef idx="2">
+            <a:schemeClr val="accent1">
+              <a:shade val="50000"/>
+            </a:schemeClr>
+          </a:lnRef>
+          <a:fillRef idx="1">
+            <a:schemeClr val="accent1"/>
+          </a:fillRef>
+          <a:effectRef idx="0">
+            <a:schemeClr val="accent1"/>
+          </a:effectRef>
+          <a:fontRef idx="minor">
+            <a:schemeClr val="lt1"/>
+          </a:fontRef>
+        </p:style>
+        <p:txBody>
+          <a:bodyPr rtlCol="0" anchor="ctr"/>
+          <a:lstStyle/>
+          <a:p>
+            <a:pPr algn="ctr"/>
+            <a:endParaRPr lang="en-US"/>
+          </a:p>
+        </p:txBody>
+      </p:sp>
+      <p:sp>
+        <p:nvSpPr>
+          <p:cNvPr id="8" name="ZoneTexte 7"/>
+          <p:cNvSpPr txBox="1"/>
+          <p:nvPr/>
+        </p:nvSpPr>
+        <p:spPr>
+          <a:xfrm>
+            <a:off x="86232" y="359348"/>
+            <a:ext cx="492443" cy="1332000"/>
+          </a:xfrm>
           <a:prstGeom prst="rect">
             <a:avLst/>
+          </a:prstGeom>
+          <a:noFill/>
+          <a:ln>
+            <a:noFill/>
+          </a:ln>
+        </p:spPr>
+        <p:txBody>
+          <a:bodyPr vert="vert270" wrap="square" rtlCol="0">
+            <a:spAutoFit/>
+          </a:bodyPr>
+          <a:lstStyle/>
+          <a:p>
+            <a:pPr algn="ctr">
+              <a:spcAft>
+                <a:spcPts val="300"/>
+              </a:spcAft>
+            </a:pPr>
+            <a:r>
+              <a:rPr lang="en-US" sz="1000" dirty="0" smtClean="0">
+                <a:solidFill>
+                  <a:srgbClr val="061229"/>
+                </a:solidFill>
+                <a:latin typeface="Helvetica" pitchFamily="2" charset="0"/>
+                <a:ea typeface="Roboto" pitchFamily="2" charset="0"/>
+                <a:cs typeface="Times New Roman" panose="02020603050405020304" pitchFamily="18" charset="0"/>
+              </a:rPr>
+              <a:t>NEURO-PHYSIOLOGY</a:t>
+            </a:r>
+            <a:endParaRPr lang="en-US" sz="1000" dirty="0">
+              <a:solidFill>
+                <a:srgbClr val="061229"/>
+              </a:solidFill>
+              <a:latin typeface="Helvetica" pitchFamily="2" charset="0"/>
+              <a:ea typeface="Roboto" pitchFamily="2" charset="0"/>
+              <a:cs typeface="Times New Roman" panose="02020603050405020304" pitchFamily="18" charset="0"/>
+            </a:endParaRPr>
+          </a:p>
+        </p:txBody>
+      </p:sp>
+      <p:sp>
+        <p:nvSpPr>
+          <p:cNvPr id="20" name="ZoneTexte 19"/>
+          <p:cNvSpPr txBox="1"/>
+          <p:nvPr/>
+        </p:nvSpPr>
+        <p:spPr>
+          <a:xfrm>
+            <a:off x="142999" y="1847138"/>
+            <a:ext cx="338554" cy="1332000"/>
+          </a:xfrm>
+          <a:prstGeom prst="rect">
+            <a:avLst/>
+          </a:prstGeom>
+          <a:noFill/>
+          <a:ln>
+            <a:noFill/>
+          </a:ln>
+        </p:spPr>
+        <p:txBody>
+          <a:bodyPr vert="vert270" wrap="square" rtlCol="0">
+            <a:spAutoFit/>
+          </a:bodyPr>
+          <a:lstStyle/>
+          <a:p>
+            <a:pPr algn="ctr">
+              <a:spcAft>
+                <a:spcPts val="300"/>
+              </a:spcAft>
+            </a:pPr>
+            <a:r>
+              <a:rPr lang="en-US" sz="1000" dirty="0" smtClean="0">
+                <a:solidFill>
+                  <a:srgbClr val="061229"/>
+                </a:solidFill>
+                <a:latin typeface="Helvetica" pitchFamily="2" charset="0"/>
+                <a:ea typeface="Roboto" pitchFamily="2" charset="0"/>
+                <a:cs typeface="Times New Roman" panose="02020603050405020304" pitchFamily="18" charset="0"/>
+              </a:rPr>
+              <a:t>BEHAVIOR</a:t>
+            </a:r>
+            <a:endParaRPr lang="en-US" sz="1000" dirty="0">
+              <a:solidFill>
+                <a:srgbClr val="061229"/>
+              </a:solidFill>
+              <a:latin typeface="Helvetica" pitchFamily="2" charset="0"/>
+              <a:ea typeface="Roboto" pitchFamily="2" charset="0"/>
+              <a:cs typeface="Times New Roman" panose="02020603050405020304" pitchFamily="18" charset="0"/>
+            </a:endParaRPr>
+          </a:p>
+        </p:txBody>
+      </p:sp>
+      <p:sp>
+        <p:nvSpPr>
+          <p:cNvPr id="22" name="ZoneTexte 21"/>
+          <p:cNvSpPr txBox="1"/>
+          <p:nvPr/>
+        </p:nvSpPr>
+        <p:spPr>
+          <a:xfrm>
+            <a:off x="66055" y="3338509"/>
+            <a:ext cx="492443" cy="1332000"/>
+          </a:xfrm>
+          <a:prstGeom prst="rect">
+            <a:avLst/>
+          </a:prstGeom>
+          <a:noFill/>
+          <a:ln>
+            <a:noFill/>
+          </a:ln>
+        </p:spPr>
+        <p:txBody>
+          <a:bodyPr vert="vert270" wrap="square" rtlCol="0">
+            <a:spAutoFit/>
+          </a:bodyPr>
+          <a:lstStyle/>
+          <a:p>
+            <a:pPr algn="ctr">
+              <a:spcAft>
+                <a:spcPts val="300"/>
+              </a:spcAft>
+            </a:pPr>
+            <a:r>
+              <a:rPr lang="en-US" sz="1000" dirty="0" smtClean="0">
+                <a:solidFill>
+                  <a:srgbClr val="061229"/>
+                </a:solidFill>
+                <a:latin typeface="Helvetica" pitchFamily="2" charset="0"/>
+                <a:ea typeface="Roboto" pitchFamily="2" charset="0"/>
+                <a:cs typeface="Times New Roman" panose="02020603050405020304" pitchFamily="18" charset="0"/>
+              </a:rPr>
+              <a:t>SOFTWARE DEVELOPEMENT</a:t>
+            </a:r>
+            <a:endParaRPr lang="en-US" sz="1000" dirty="0">
+              <a:solidFill>
+                <a:srgbClr val="061229"/>
+              </a:solidFill>
+              <a:latin typeface="Helvetica" pitchFamily="2" charset="0"/>
+              <a:ea typeface="Roboto" pitchFamily="2" charset="0"/>
+              <a:cs typeface="Times New Roman" panose="02020603050405020304" pitchFamily="18" charset="0"/>
+            </a:endParaRPr>
+          </a:p>
+        </p:txBody>
+      </p:sp>
+      <p:sp>
+        <p:nvSpPr>
+          <p:cNvPr id="19" name="ZoneTexte 18"/>
+          <p:cNvSpPr txBox="1"/>
+          <p:nvPr/>
+        </p:nvSpPr>
+        <p:spPr>
+          <a:xfrm>
+            <a:off x="683640" y="459809"/>
+            <a:ext cx="2520000" cy="1138773"/>
+          </a:xfrm>
+          <a:prstGeom prst="rect">
+            <a:avLst/>
+          </a:prstGeom>
+          <a:solidFill>
+            <a:srgbClr val="D9F2FB"/>
+          </a:solidFill>
+          <a:effectLst>
+            <a:outerShdw blurRad="25400" dist="25400" dir="2700000" algn="tl" rotWithShape="0">
+              <a:schemeClr val="tx1">
+                <a:lumMod val="50000"/>
+                <a:lumOff val="50000"/>
+                <a:alpha val="60000"/>
+              </a:schemeClr>
+            </a:outerShdw>
+          </a:effectLst>
+        </p:spPr>
+        <p:txBody>
+          <a:bodyPr wrap="square" rtlCol="0">
+            <a:spAutoFit/>
+          </a:bodyPr>
+          <a:lstStyle/>
+          <a:p>
+            <a:pPr>
+              <a:spcAft>
+                <a:spcPts val="600"/>
+              </a:spcAft>
+            </a:pPr>
+            <a:r>
+              <a:rPr lang="en-US" sz="1000" dirty="0">
+                <a:latin typeface="Roboto Light" panose="02000000000000000000" pitchFamily="2" charset="0"/>
+                <a:ea typeface="Roboto Light" panose="02000000000000000000" pitchFamily="2" charset="0"/>
+              </a:rPr>
+              <a:t>Study </a:t>
+            </a:r>
+            <a:r>
+              <a:rPr lang="en-US" sz="1000" dirty="0" smtClean="0">
+                <a:latin typeface="Roboto Light" panose="02000000000000000000" pitchFamily="2" charset="0"/>
+                <a:ea typeface="Roboto Light" panose="02000000000000000000" pitchFamily="2" charset="0"/>
+              </a:rPr>
+              <a:t>1 	            </a:t>
+            </a:r>
+            <a:r>
+              <a:rPr lang="en-US" sz="1000" dirty="0" smtClean="0">
+                <a:latin typeface="Roboto Light" panose="02000000000000000000" pitchFamily="2" charset="0"/>
+                <a:ea typeface="Roboto Light" panose="02000000000000000000" pitchFamily="2" charset="0"/>
+              </a:rPr>
+              <a:t>	         </a:t>
+            </a:r>
+            <a:r>
+              <a:rPr lang="en-US" sz="1000" i="1" dirty="0" smtClean="0">
+                <a:solidFill>
+                  <a:schemeClr val="tx1">
+                    <a:lumMod val="75000"/>
+                    <a:lumOff val="25000"/>
+                  </a:schemeClr>
+                </a:solidFill>
+                <a:latin typeface="Roboto Light" panose="02000000000000000000" pitchFamily="2" charset="0"/>
+                <a:ea typeface="Roboto Light" panose="02000000000000000000" pitchFamily="2" charset="0"/>
+              </a:rPr>
+              <a:t>EEG</a:t>
+            </a:r>
+            <a:endParaRPr lang="en-US" sz="1000" dirty="0" smtClean="0">
+              <a:solidFill>
+                <a:schemeClr val="tx1">
+                  <a:lumMod val="75000"/>
+                  <a:lumOff val="25000"/>
+                </a:schemeClr>
+              </a:solidFill>
+              <a:latin typeface="Roboto Light" panose="02000000000000000000" pitchFamily="2" charset="0"/>
+              <a:ea typeface="Roboto Light" panose="02000000000000000000" pitchFamily="2" charset="0"/>
+            </a:endParaRPr>
+          </a:p>
+          <a:p>
+            <a:pPr>
+              <a:spcAft>
+                <a:spcPts val="300"/>
+              </a:spcAft>
+            </a:pPr>
+            <a:r>
+              <a:rPr lang="en-US" sz="1050" b="1" dirty="0" smtClean="0">
+                <a:latin typeface="Helvetica Neue" panose="02000503000000020004" pitchFamily="50"/>
+              </a:rPr>
+              <a:t>DRF and arousals</a:t>
+            </a:r>
+            <a:endParaRPr lang="en-US" sz="1050" b="1" dirty="0">
+              <a:latin typeface="Helvetica Neue" panose="02000503000000020004" pitchFamily="50"/>
+            </a:endParaRPr>
+          </a:p>
+          <a:p>
+            <a:pPr algn="just"/>
+            <a:r>
+              <a:rPr lang="en-US" sz="1000" dirty="0" smtClean="0">
+                <a:latin typeface="Helvetica Neue" panose="02000503000000020004" pitchFamily="50"/>
+              </a:rPr>
+              <a:t>We investigated the sleep macro- and micro-structure of high and low dream-recallers, as well as their brain responses to arousing stimuli during sleep.</a:t>
+            </a:r>
+            <a:endParaRPr lang="en-US" sz="1000" dirty="0" smtClean="0">
+              <a:latin typeface="Helvetica Neue" panose="02000503000000020004" pitchFamily="50"/>
+            </a:endParaRPr>
+          </a:p>
+        </p:txBody>
+      </p:sp>
+      <p:sp>
+        <p:nvSpPr>
+          <p:cNvPr id="27" name="ZoneTexte 26"/>
+          <p:cNvSpPr txBox="1"/>
+          <p:nvPr/>
+        </p:nvSpPr>
+        <p:spPr>
+          <a:xfrm>
+            <a:off x="3321123" y="459809"/>
+            <a:ext cx="2520001" cy="1138773"/>
+          </a:xfrm>
+          <a:prstGeom prst="rect">
+            <a:avLst/>
+          </a:prstGeom>
+          <a:solidFill>
+            <a:srgbClr val="9DDEF5"/>
+          </a:solidFill>
+          <a:effectLst>
+            <a:outerShdw blurRad="25400" dist="25400" dir="2700000" algn="tl" rotWithShape="0">
+              <a:schemeClr val="tx1">
+                <a:lumMod val="50000"/>
+                <a:lumOff val="50000"/>
+                <a:alpha val="60000"/>
+              </a:schemeClr>
+            </a:outerShdw>
+          </a:effectLst>
+        </p:spPr>
+        <p:txBody>
+          <a:bodyPr wrap="square" rtlCol="0">
+            <a:spAutoFit/>
+          </a:bodyPr>
+          <a:lstStyle/>
+          <a:p>
+            <a:pPr>
+              <a:spcAft>
+                <a:spcPts val="600"/>
+              </a:spcAft>
+            </a:pPr>
+            <a:r>
+              <a:rPr lang="en-US" sz="1000" dirty="0">
+                <a:latin typeface="Roboto Light" panose="02000000000000000000" pitchFamily="2" charset="0"/>
+                <a:ea typeface="Roboto Light" panose="02000000000000000000" pitchFamily="2" charset="0"/>
+              </a:rPr>
+              <a:t>Study </a:t>
+            </a:r>
+            <a:r>
+              <a:rPr lang="en-US" sz="1000" dirty="0" smtClean="0">
+                <a:latin typeface="Roboto Light" panose="02000000000000000000" pitchFamily="2" charset="0"/>
+                <a:ea typeface="Roboto Light" panose="02000000000000000000" pitchFamily="2" charset="0"/>
+              </a:rPr>
+              <a:t>2	  </a:t>
+            </a:r>
+            <a:r>
+              <a:rPr lang="en-US" sz="1000" dirty="0" smtClean="0">
+                <a:latin typeface="Roboto Light" panose="02000000000000000000" pitchFamily="2" charset="0"/>
+                <a:ea typeface="Roboto Light" panose="02000000000000000000" pitchFamily="2" charset="0"/>
+              </a:rPr>
+              <a:t>                           </a:t>
+            </a:r>
+            <a:r>
+              <a:rPr lang="en-US" sz="1000" i="1" dirty="0" smtClean="0">
+                <a:solidFill>
+                  <a:schemeClr val="tx1">
+                    <a:lumMod val="75000"/>
+                    <a:lumOff val="25000"/>
+                  </a:schemeClr>
+                </a:solidFill>
+                <a:latin typeface="Roboto Light" panose="02000000000000000000" pitchFamily="2" charset="0"/>
+                <a:ea typeface="Roboto Light" panose="02000000000000000000" pitchFamily="2" charset="0"/>
+              </a:rPr>
+              <a:t>EEG-fMRI</a:t>
+            </a:r>
+            <a:endParaRPr lang="en-US" sz="1000" i="1" dirty="0" smtClean="0">
+              <a:solidFill>
+                <a:schemeClr val="tx1">
+                  <a:lumMod val="75000"/>
+                  <a:lumOff val="25000"/>
+                </a:schemeClr>
+              </a:solidFill>
+              <a:latin typeface="Roboto Light" panose="02000000000000000000" pitchFamily="2" charset="0"/>
+              <a:ea typeface="Roboto Light" panose="02000000000000000000" pitchFamily="2" charset="0"/>
+            </a:endParaRPr>
+          </a:p>
+          <a:p>
+            <a:pPr>
+              <a:spcAft>
+                <a:spcPts val="300"/>
+              </a:spcAft>
+            </a:pPr>
+            <a:r>
+              <a:rPr lang="en-US" sz="1050" b="1" dirty="0" smtClean="0">
+                <a:latin typeface="Helvetica Neue" panose="02000503000000020004" pitchFamily="50"/>
+              </a:rPr>
+              <a:t>DRF and sleep inertia</a:t>
+            </a:r>
+            <a:endParaRPr lang="en-US" sz="1050" b="1" dirty="0">
+              <a:latin typeface="Helvetica Neue" panose="02000503000000020004" pitchFamily="50"/>
+            </a:endParaRPr>
+          </a:p>
+          <a:p>
+            <a:pPr algn="just"/>
+            <a:r>
+              <a:rPr lang="en-US" sz="1000" dirty="0" smtClean="0">
+                <a:latin typeface="Helvetica Neue" panose="02000503000000020004" pitchFamily="50"/>
+              </a:rPr>
+              <a:t>We tested the hypothesis of a differential sleep inertia in </a:t>
+            </a:r>
+            <a:r>
+              <a:rPr lang="en-US" sz="1000" dirty="0" smtClean="0">
+                <a:latin typeface="Helvetica Neue" panose="02000503000000020004" pitchFamily="50"/>
+              </a:rPr>
+              <a:t>high and low dream recallers and provided at the same time an overview of the awakening brain.</a:t>
+            </a:r>
+            <a:endParaRPr lang="en-US" sz="1000" dirty="0">
+              <a:latin typeface="Helvetica Neue" panose="02000503000000020004" pitchFamily="50"/>
+            </a:endParaRPr>
+          </a:p>
+        </p:txBody>
+      </p:sp>
+      <p:sp>
+        <p:nvSpPr>
+          <p:cNvPr id="36" name="ZoneTexte 35"/>
+          <p:cNvSpPr txBox="1"/>
+          <p:nvPr/>
+        </p:nvSpPr>
+        <p:spPr>
+          <a:xfrm>
+            <a:off x="686976" y="1943751"/>
+            <a:ext cx="2520000" cy="1138773"/>
+          </a:xfrm>
+          <a:prstGeom prst="rect">
+            <a:avLst/>
+          </a:prstGeom>
+          <a:solidFill>
+            <a:schemeClr val="accent6">
+              <a:lumMod val="20000"/>
+              <a:lumOff val="80000"/>
+            </a:schemeClr>
+          </a:solidFill>
+          <a:effectLst>
+            <a:outerShdw blurRad="25400" dist="25400" dir="2700000" algn="tl" rotWithShape="0">
+              <a:schemeClr val="tx1">
+                <a:lumMod val="50000"/>
+                <a:lumOff val="50000"/>
+                <a:alpha val="60000"/>
+              </a:schemeClr>
+            </a:outerShdw>
+          </a:effectLst>
+        </p:spPr>
+        <p:txBody>
+          <a:bodyPr wrap="square" rtlCol="0">
+            <a:spAutoFit/>
+          </a:bodyPr>
+          <a:lstStyle/>
+          <a:p>
+            <a:pPr>
+              <a:spcAft>
+                <a:spcPts val="600"/>
+              </a:spcAft>
+            </a:pPr>
+            <a:r>
+              <a:rPr lang="en-US" sz="1000" dirty="0">
+                <a:latin typeface="Roboto Light" panose="02000000000000000000" pitchFamily="2" charset="0"/>
+                <a:ea typeface="Roboto Light" panose="02000000000000000000" pitchFamily="2" charset="0"/>
+              </a:rPr>
+              <a:t>Study </a:t>
+            </a:r>
+            <a:r>
+              <a:rPr lang="en-US" sz="1000" dirty="0" smtClean="0">
+                <a:latin typeface="Roboto Light" panose="02000000000000000000" pitchFamily="2" charset="0"/>
+                <a:ea typeface="Roboto Light" panose="02000000000000000000" pitchFamily="2" charset="0"/>
+              </a:rPr>
+              <a:t>3 	       </a:t>
+            </a:r>
+            <a:r>
+              <a:rPr lang="en-US" sz="1000" dirty="0" smtClean="0">
+                <a:latin typeface="Roboto Light" panose="02000000000000000000" pitchFamily="2" charset="0"/>
+                <a:ea typeface="Roboto Light" panose="02000000000000000000" pitchFamily="2" charset="0"/>
+              </a:rPr>
+              <a:t>	    </a:t>
+            </a:r>
+            <a:r>
+              <a:rPr lang="en-US" sz="1000" i="1" dirty="0" smtClean="0">
+                <a:solidFill>
+                  <a:schemeClr val="tx1">
+                    <a:lumMod val="75000"/>
+                    <a:lumOff val="25000"/>
+                  </a:schemeClr>
+                </a:solidFill>
+                <a:latin typeface="Roboto Light" panose="02000000000000000000" pitchFamily="2" charset="0"/>
+                <a:ea typeface="Roboto Light" panose="02000000000000000000" pitchFamily="2" charset="0"/>
+              </a:rPr>
+              <a:t>Survey</a:t>
+            </a:r>
+            <a:endParaRPr lang="en-US" sz="1000" i="1" dirty="0" smtClean="0">
+              <a:solidFill>
+                <a:schemeClr val="tx1">
+                  <a:lumMod val="75000"/>
+                  <a:lumOff val="25000"/>
+                </a:schemeClr>
+              </a:solidFill>
+              <a:latin typeface="Roboto Light" panose="02000000000000000000" pitchFamily="2" charset="0"/>
+              <a:ea typeface="Roboto Light" panose="02000000000000000000" pitchFamily="2" charset="0"/>
+            </a:endParaRPr>
+          </a:p>
+          <a:p>
+            <a:pPr>
+              <a:spcAft>
+                <a:spcPts val="300"/>
+              </a:spcAft>
+            </a:pPr>
+            <a:r>
+              <a:rPr lang="en-US" sz="1050" b="1" dirty="0" smtClean="0">
+                <a:latin typeface="Helvetica Neue" panose="02000503000000020004" pitchFamily="50"/>
+              </a:rPr>
+              <a:t>Sleep and dream habits</a:t>
+            </a:r>
+          </a:p>
+          <a:p>
+            <a:pPr algn="just">
+              <a:spcAft>
+                <a:spcPts val="300"/>
+              </a:spcAft>
+            </a:pPr>
+            <a:r>
+              <a:rPr lang="en-US" sz="1000" dirty="0" smtClean="0">
+                <a:latin typeface="Helvetica Neue" panose="02000503000000020004" pitchFamily="50"/>
+              </a:rPr>
+              <a:t>We used an online questionnaire to collect data on sleep </a:t>
+            </a:r>
+            <a:r>
+              <a:rPr lang="en-US" sz="1000" dirty="0" smtClean="0">
+                <a:latin typeface="Helvetica Neue" panose="02000503000000020004" pitchFamily="50"/>
+              </a:rPr>
+              <a:t>and dream habits of a large sample of French college students.</a:t>
+            </a:r>
+            <a:endParaRPr lang="en-US" sz="1000" dirty="0">
+              <a:latin typeface="Helvetica Neue" panose="02000503000000020004" pitchFamily="50"/>
+            </a:endParaRPr>
+          </a:p>
+        </p:txBody>
+      </p:sp>
+      <p:sp>
+        <p:nvSpPr>
+          <p:cNvPr id="37" name="ZoneTexte 36"/>
+          <p:cNvSpPr txBox="1"/>
+          <p:nvPr/>
+        </p:nvSpPr>
+        <p:spPr>
+          <a:xfrm>
+            <a:off x="3321124" y="1942739"/>
+            <a:ext cx="2520000" cy="1138773"/>
+          </a:xfrm>
+          <a:prstGeom prst="rect">
+            <a:avLst/>
+          </a:prstGeom>
+          <a:solidFill>
+            <a:srgbClr val="FFCDB7"/>
+          </a:solidFill>
+          <a:effectLst>
+            <a:outerShdw blurRad="25400" dist="25400" dir="2700000" algn="tl" rotWithShape="0">
+              <a:schemeClr val="tx1">
+                <a:lumMod val="50000"/>
+                <a:lumOff val="50000"/>
+                <a:alpha val="60000"/>
+              </a:schemeClr>
+            </a:outerShdw>
+          </a:effectLst>
+        </p:spPr>
+        <p:txBody>
+          <a:bodyPr wrap="square" rtlCol="0">
+            <a:spAutoFit/>
+          </a:bodyPr>
+          <a:lstStyle/>
+          <a:p>
+            <a:pPr>
+              <a:spcAft>
+                <a:spcPts val="600"/>
+              </a:spcAft>
+            </a:pPr>
+            <a:r>
+              <a:rPr lang="en-US" sz="1000" dirty="0">
+                <a:latin typeface="Roboto Light" panose="02000000000000000000" pitchFamily="2" charset="0"/>
+                <a:ea typeface="Roboto Light" panose="02000000000000000000" pitchFamily="2" charset="0"/>
+              </a:rPr>
+              <a:t>Study </a:t>
+            </a:r>
+            <a:r>
+              <a:rPr lang="en-US" sz="1000" dirty="0" smtClean="0">
+                <a:latin typeface="Roboto Light" panose="02000000000000000000" pitchFamily="2" charset="0"/>
+                <a:ea typeface="Roboto Light" panose="02000000000000000000" pitchFamily="2" charset="0"/>
+              </a:rPr>
+              <a:t>4 	      </a:t>
+            </a:r>
+            <a:r>
+              <a:rPr lang="en-US" sz="1000" i="1" dirty="0" smtClean="0">
+                <a:solidFill>
+                  <a:schemeClr val="tx1">
+                    <a:lumMod val="75000"/>
+                    <a:lumOff val="25000"/>
+                  </a:schemeClr>
+                </a:solidFill>
+                <a:latin typeface="Roboto Light" panose="02000000000000000000" pitchFamily="2" charset="0"/>
+                <a:ea typeface="Roboto Light" panose="02000000000000000000" pitchFamily="2" charset="0"/>
+              </a:rPr>
+              <a:t>Dream questionnaires  </a:t>
+            </a:r>
+            <a:r>
+              <a:rPr lang="en-US" sz="1000" dirty="0" smtClean="0">
+                <a:solidFill>
+                  <a:schemeClr val="tx1">
+                    <a:lumMod val="75000"/>
+                    <a:lumOff val="25000"/>
+                  </a:schemeClr>
+                </a:solidFill>
+                <a:latin typeface="Roboto Light" panose="02000000000000000000" pitchFamily="2" charset="0"/>
+                <a:ea typeface="Roboto Light" panose="02000000000000000000" pitchFamily="2" charset="0"/>
+              </a:rPr>
+              <a:t> </a:t>
+            </a:r>
+            <a:endParaRPr lang="en-US" sz="1000" dirty="0" smtClean="0">
+              <a:solidFill>
+                <a:schemeClr val="tx1">
+                  <a:lumMod val="75000"/>
+                  <a:lumOff val="25000"/>
+                </a:schemeClr>
+              </a:solidFill>
+              <a:latin typeface="Roboto Light" panose="02000000000000000000" pitchFamily="2" charset="0"/>
+              <a:ea typeface="Roboto Light" panose="02000000000000000000" pitchFamily="2" charset="0"/>
+            </a:endParaRPr>
+          </a:p>
+          <a:p>
+            <a:pPr>
+              <a:spcAft>
+                <a:spcPts val="300"/>
+              </a:spcAft>
+            </a:pPr>
+            <a:r>
+              <a:rPr lang="en-US" sz="1050" b="1" dirty="0" smtClean="0">
+                <a:latin typeface="Helvetica Neue" panose="02000503000000020004" pitchFamily="50"/>
+              </a:rPr>
+              <a:t>The memory sources of dreams</a:t>
+            </a:r>
+            <a:endParaRPr lang="en-US" sz="1050" b="1" dirty="0">
+              <a:latin typeface="Helvetica Neue" panose="02000503000000020004" pitchFamily="50"/>
+            </a:endParaRPr>
+          </a:p>
+          <a:p>
+            <a:pPr algn="just"/>
+            <a:r>
+              <a:rPr lang="en-US" sz="1000" dirty="0" smtClean="0">
+                <a:latin typeface="Helvetica Neue" panose="02000503000000020004" pitchFamily="50"/>
+              </a:rPr>
+              <a:t>We investigated the </a:t>
+            </a:r>
+            <a:r>
+              <a:rPr lang="en-US" sz="1000" dirty="0" smtClean="0">
+                <a:latin typeface="Helvetica Neue" panose="02000503000000020004" pitchFamily="50"/>
+              </a:rPr>
+              <a:t>characteristics of the memory sources incorporated into dreams, especially remote and trivial </a:t>
+            </a:r>
+            <a:r>
+              <a:rPr lang="en-US" sz="1000" dirty="0" smtClean="0">
+                <a:latin typeface="Helvetica Neue" panose="02000503000000020004" pitchFamily="50"/>
+              </a:rPr>
+              <a:t>ones.</a:t>
+            </a:r>
+            <a:endParaRPr lang="en-US" sz="1000" dirty="0" smtClean="0">
+              <a:latin typeface="Helvetica Neue" panose="02000503000000020004" pitchFamily="50"/>
+            </a:endParaRPr>
+          </a:p>
+        </p:txBody>
+      </p:sp>
+      <p:cxnSp>
+        <p:nvCxnSpPr>
+          <p:cNvPr id="16" name="Connecteur droit 15"/>
+          <p:cNvCxnSpPr/>
+          <p:nvPr/>
+        </p:nvCxnSpPr>
+        <p:spPr>
+          <a:xfrm>
+            <a:off x="66054" y="1765530"/>
+            <a:ext cx="5796000" cy="0"/>
+          </a:xfrm>
+          <a:prstGeom prst="line">
+            <a:avLst/>
+          </a:prstGeom>
+          <a:ln w="12700">
+            <a:solidFill>
+              <a:srgbClr val="1D1F21"/>
+            </a:solidFill>
+            <a:prstDash val="sysDot"/>
+          </a:ln>
+        </p:spPr>
+        <p:style>
+          <a:lnRef idx="1">
+            <a:schemeClr val="dk1"/>
+          </a:lnRef>
+          <a:fillRef idx="0">
+            <a:schemeClr val="dk1"/>
+          </a:fillRef>
+          <a:effectRef idx="0">
+            <a:schemeClr val="dk1"/>
+          </a:effectRef>
+          <a:fontRef idx="minor">
+            <a:schemeClr val="tx1"/>
+          </a:fontRef>
+        </p:style>
+      </p:cxnSp>
+      <p:cxnSp>
+        <p:nvCxnSpPr>
+          <p:cNvPr id="24" name="Connecteur droit 23"/>
+          <p:cNvCxnSpPr/>
+          <p:nvPr/>
+        </p:nvCxnSpPr>
+        <p:spPr>
+          <a:xfrm>
+            <a:off x="66054" y="3260240"/>
+            <a:ext cx="5796000" cy="0"/>
+          </a:xfrm>
+          <a:prstGeom prst="line">
+            <a:avLst/>
+          </a:prstGeom>
+          <a:ln w="12700">
+            <a:solidFill>
+              <a:srgbClr val="1D1F21"/>
+            </a:solidFill>
+            <a:prstDash val="sysDot"/>
+          </a:ln>
+        </p:spPr>
+        <p:style>
+          <a:lnRef idx="1">
+            <a:schemeClr val="dk1"/>
+          </a:lnRef>
+          <a:fillRef idx="0">
+            <a:schemeClr val="dk1"/>
+          </a:fillRef>
+          <a:effectRef idx="0">
+            <a:schemeClr val="dk1"/>
+          </a:effectRef>
+          <a:fontRef idx="minor">
+            <a:schemeClr val="tx1"/>
+          </a:fontRef>
+        </p:style>
+      </p:cxnSp>
+      <p:sp>
+        <p:nvSpPr>
+          <p:cNvPr id="14" name="ZoneTexte 13"/>
+          <p:cNvSpPr txBox="1"/>
+          <p:nvPr/>
+        </p:nvSpPr>
+        <p:spPr>
+          <a:xfrm>
+            <a:off x="683641" y="3438969"/>
+            <a:ext cx="5157484" cy="1138773"/>
+          </a:xfrm>
+          <a:prstGeom prst="rect">
+            <a:avLst/>
+          </a:prstGeom>
+          <a:solidFill>
+            <a:srgbClr val="B2CEBF"/>
+          </a:solidFill>
+          <a:effectLst>
+            <a:outerShdw blurRad="25400" dist="25400" dir="2700000" algn="tl" rotWithShape="0">
+              <a:schemeClr val="tx1">
+                <a:lumMod val="50000"/>
+                <a:lumOff val="50000"/>
+                <a:alpha val="60000"/>
+              </a:schemeClr>
+            </a:outerShdw>
+          </a:effectLst>
+        </p:spPr>
+        <p:txBody>
+          <a:bodyPr wrap="square" rtlCol="0">
+            <a:spAutoFit/>
+          </a:bodyPr>
+          <a:lstStyle/>
+          <a:p>
+            <a:pPr>
+              <a:spcAft>
+                <a:spcPts val="600"/>
+              </a:spcAft>
+            </a:pPr>
+            <a:r>
+              <a:rPr lang="en-US" sz="1000" dirty="0">
+                <a:latin typeface="Roboto Light" panose="02000000000000000000" pitchFamily="2" charset="0"/>
+                <a:ea typeface="Roboto Light" panose="02000000000000000000" pitchFamily="2" charset="0"/>
+              </a:rPr>
+              <a:t>Study </a:t>
+            </a:r>
+            <a:r>
+              <a:rPr lang="en-US" sz="1000" dirty="0" smtClean="0">
+                <a:latin typeface="Roboto Light" panose="02000000000000000000" pitchFamily="2" charset="0"/>
+                <a:ea typeface="Roboto Light" panose="02000000000000000000" pitchFamily="2" charset="0"/>
+              </a:rPr>
+              <a:t>5		</a:t>
+            </a:r>
+            <a:r>
+              <a:rPr lang="en-US" sz="1000" dirty="0">
+                <a:solidFill>
+                  <a:schemeClr val="tx1">
+                    <a:lumMod val="75000"/>
+                    <a:lumOff val="25000"/>
+                  </a:schemeClr>
+                </a:solidFill>
+                <a:latin typeface="Roboto Light" panose="02000000000000000000" pitchFamily="2" charset="0"/>
+                <a:ea typeface="Roboto Light" panose="02000000000000000000" pitchFamily="2" charset="0"/>
+              </a:rPr>
+              <a:t> </a:t>
+            </a:r>
+            <a:r>
+              <a:rPr lang="en-US" sz="1000" dirty="0" smtClean="0">
+                <a:solidFill>
+                  <a:schemeClr val="tx1">
+                    <a:lumMod val="75000"/>
+                    <a:lumOff val="25000"/>
+                  </a:schemeClr>
+                </a:solidFill>
+                <a:latin typeface="Roboto Light" panose="02000000000000000000" pitchFamily="2" charset="0"/>
+                <a:ea typeface="Roboto Light" panose="02000000000000000000" pitchFamily="2" charset="0"/>
+              </a:rPr>
+              <a:t>                      </a:t>
+            </a:r>
+            <a:r>
+              <a:rPr lang="en-US" sz="1000" dirty="0" smtClean="0">
+                <a:solidFill>
+                  <a:schemeClr val="tx1">
+                    <a:lumMod val="75000"/>
+                    <a:lumOff val="25000"/>
+                  </a:schemeClr>
+                </a:solidFill>
+                <a:latin typeface="Roboto Light" panose="02000000000000000000" pitchFamily="2" charset="0"/>
+                <a:ea typeface="Roboto Light" panose="02000000000000000000" pitchFamily="2" charset="0"/>
+              </a:rPr>
+              <a:t> 	 	                  </a:t>
+            </a:r>
+            <a:r>
+              <a:rPr lang="en-US" sz="1000" i="1" dirty="0" smtClean="0">
+                <a:solidFill>
+                  <a:schemeClr val="tx1">
+                    <a:lumMod val="75000"/>
+                    <a:lumOff val="25000"/>
+                  </a:schemeClr>
+                </a:solidFill>
+                <a:latin typeface="Roboto Light" panose="02000000000000000000" pitchFamily="2" charset="0"/>
+                <a:ea typeface="Roboto Light" panose="02000000000000000000" pitchFamily="2" charset="0"/>
+              </a:rPr>
+              <a:t>Programming</a:t>
+            </a:r>
+            <a:endParaRPr lang="en-US" sz="1000" i="1" dirty="0" smtClean="0">
+              <a:solidFill>
+                <a:schemeClr val="tx1">
+                  <a:lumMod val="75000"/>
+                  <a:lumOff val="25000"/>
+                </a:schemeClr>
+              </a:solidFill>
+              <a:latin typeface="Roboto Light" panose="02000000000000000000" pitchFamily="2" charset="0"/>
+              <a:ea typeface="Roboto Light" panose="02000000000000000000" pitchFamily="2" charset="0"/>
+            </a:endParaRPr>
+          </a:p>
+          <a:p>
+            <a:pPr>
+              <a:spcAft>
+                <a:spcPts val="300"/>
+              </a:spcAft>
+            </a:pPr>
+            <a:r>
+              <a:rPr lang="en-US" sz="1050" b="1" dirty="0" smtClean="0">
+                <a:latin typeface="Helvetica Neue" panose="02000503000000020004" pitchFamily="50"/>
+              </a:rPr>
+              <a:t>An open-source software for sleep data</a:t>
+            </a:r>
+            <a:endParaRPr lang="en-US" sz="1050" b="1" dirty="0">
+              <a:latin typeface="Helvetica Neue" panose="02000503000000020004" pitchFamily="50"/>
+            </a:endParaRPr>
+          </a:p>
+          <a:p>
+            <a:pPr algn="just"/>
+            <a:r>
+              <a:rPr lang="en-US" sz="1000" dirty="0" smtClean="0">
+                <a:latin typeface="Helvetica Neue" panose="02000503000000020004" pitchFamily="50"/>
+              </a:rPr>
+              <a:t>There is a lack of free and </a:t>
+            </a:r>
+            <a:r>
+              <a:rPr lang="en-US" sz="1000" dirty="0">
+                <a:latin typeface="Helvetica Neue" panose="02000503000000020004" pitchFamily="50"/>
+              </a:rPr>
+              <a:t>easy-to-use </a:t>
+            </a:r>
+            <a:r>
+              <a:rPr lang="en-US" sz="1000" dirty="0" smtClean="0">
+                <a:latin typeface="Helvetica Neue" panose="02000503000000020004" pitchFamily="50"/>
+              </a:rPr>
+              <a:t>graphical user interface dedicated to sleep data visualization, scoring and analysis. To fill this gap, we developed an </a:t>
+            </a:r>
+            <a:r>
+              <a:rPr lang="en-US" sz="1000" dirty="0" smtClean="0">
+                <a:latin typeface="Helvetica Neue" panose="02000503000000020004" pitchFamily="50"/>
+              </a:rPr>
+              <a:t>open-source </a:t>
+            </a:r>
+            <a:r>
+              <a:rPr lang="en-US" sz="1000" dirty="0" smtClean="0">
+                <a:latin typeface="Helvetica Neue" panose="02000503000000020004" pitchFamily="50"/>
+              </a:rPr>
+              <a:t>Python </a:t>
+            </a:r>
+            <a:r>
+              <a:rPr lang="en-US" sz="1000" dirty="0" smtClean="0">
+                <a:latin typeface="Helvetica Neue" panose="02000503000000020004" pitchFamily="50"/>
+              </a:rPr>
+              <a:t>software capable of handling efficiently large datasets from several file formats, and integrating automatic detection of several sleep microstructural features.</a:t>
+            </a:r>
+            <a:endParaRPr lang="en-US" sz="1000" dirty="0">
+              <a:latin typeface="Helvetica Neue" panose="02000503000000020004" pitchFamily="50"/>
+            </a:endParaRPr>
+          </a:p>
+        </p:txBody>
+      </p:sp>
+    </p:spTree>
+    <p:extLst>
+      <p:ext uri="{BB962C8B-B14F-4D97-AF65-F5344CB8AC3E}">
+        <p14:creationId xmlns:p14="http://schemas.microsoft.com/office/powerpoint/2010/main" val="3792130701"/>
+      </p:ext>
+    </p:extLst>
+  </p:cSld>
+  <p:clrMapOvr>
+    <a:masterClrMapping/>
+  </p:clrMapOvr>
+  <p:timing>
+    <p:tnLst>
+      <p:par>
+        <p:cTn id="1" dur="indefinite" restart="never" nodeType="tmRoot"/>
+      </p:par>
+    </p:tnLst>
+  </p:timing>
+</p:sld>
+</file>
+
+<file path=ppt/slides/slide2.xml><?xml version="1.0" encoding="utf-8"?>
+<p:sld xmlns:a="http://schemas.openxmlformats.org/drawingml/2006/main" xmlns:r="http://schemas.openxmlformats.org/officeDocument/2006/relationships" xmlns:p="http://schemas.openxmlformats.org/presentationml/2006/main">
+  <p:cSld>
+    <p:spTree>
+      <p:nvGrpSpPr>
+        <p:cNvPr id="1" name=""/>
+        <p:cNvGrpSpPr/>
+        <p:nvPr/>
+      </p:nvGrpSpPr>
+      <p:grpSpPr>
+        <a:xfrm>
+          <a:off x="0" y="0"/>
+          <a:ext cx="0" cy="0"/>
+          <a:chOff x="0" y="0"/>
+          <a:chExt cx="0" cy="0"/>
+        </a:xfrm>
+      </p:grpSpPr>
+      <p:sp>
+        <p:nvSpPr>
+          <p:cNvPr id="3" name="Rectangle à coins arrondis 2"/>
+          <p:cNvSpPr/>
+          <p:nvPr/>
+        </p:nvSpPr>
+        <p:spPr>
+          <a:xfrm>
+            <a:off x="66054" y="359348"/>
+            <a:ext cx="532801" cy="4311161"/>
+          </a:xfrm>
+          <a:prstGeom prst="roundRect">
+            <a:avLst>
+              <a:gd name="adj" fmla="val 10645"/>
+            </a:avLst>
           </a:prstGeom>
           <a:gradFill flip="none" rotWithShape="1">
             <a:gsLst>
@@ -3246,6 +4233,1919 @@
               <a:latin typeface="Helvetica Neue" panose="02000503000000020004" pitchFamily="50"/>
               <a:ea typeface="Roboto" pitchFamily="2" charset="0"/>
               <a:cs typeface="Times New Roman" panose="02020603050405020304" pitchFamily="18" charset="0"/>
+            </a:endParaRPr>
+          </a:p>
+        </p:txBody>
+      </p:sp>
+      <p:sp>
+        <p:nvSpPr>
+          <p:cNvPr id="34" name="ZoneTexte 33"/>
+          <p:cNvSpPr txBox="1"/>
+          <p:nvPr/>
+        </p:nvSpPr>
+        <p:spPr>
+          <a:xfrm>
+            <a:off x="683641" y="3438969"/>
+            <a:ext cx="3488384" cy="1138773"/>
+          </a:xfrm>
+          <a:prstGeom prst="rect">
+            <a:avLst/>
+          </a:prstGeom>
+          <a:solidFill>
+            <a:srgbClr val="A2D2C8"/>
+          </a:solidFill>
+          <a:effectLst>
+            <a:outerShdw blurRad="50800" dist="25400" dir="2700000" algn="tl" rotWithShape="0">
+              <a:schemeClr val="tx1">
+                <a:lumMod val="50000"/>
+                <a:lumOff val="50000"/>
+                <a:alpha val="20000"/>
+              </a:schemeClr>
+            </a:outerShdw>
+          </a:effectLst>
+        </p:spPr>
+        <p:txBody>
+          <a:bodyPr wrap="square" rtlCol="0">
+            <a:spAutoFit/>
+          </a:bodyPr>
+          <a:lstStyle/>
+          <a:p>
+            <a:pPr>
+              <a:spcAft>
+                <a:spcPts val="600"/>
+              </a:spcAft>
+            </a:pPr>
+            <a:r>
+              <a:rPr lang="en-US" sz="1000" dirty="0">
+                <a:latin typeface="Roboto Light" panose="02000000000000000000" pitchFamily="2" charset="0"/>
+                <a:ea typeface="Roboto Light" panose="02000000000000000000" pitchFamily="2" charset="0"/>
+              </a:rPr>
+              <a:t>Study </a:t>
+            </a:r>
+            <a:r>
+              <a:rPr lang="en-US" sz="1000" dirty="0" smtClean="0">
+                <a:latin typeface="Roboto Light" panose="02000000000000000000" pitchFamily="2" charset="0"/>
+                <a:ea typeface="Roboto Light" panose="02000000000000000000" pitchFamily="2" charset="0"/>
+              </a:rPr>
+              <a:t>5		</a:t>
+            </a:r>
+            <a:r>
+              <a:rPr lang="en-US" sz="1000" dirty="0">
+                <a:solidFill>
+                  <a:schemeClr val="tx1">
+                    <a:lumMod val="75000"/>
+                    <a:lumOff val="25000"/>
+                  </a:schemeClr>
+                </a:solidFill>
+                <a:latin typeface="Roboto Light" panose="02000000000000000000" pitchFamily="2" charset="0"/>
+                <a:ea typeface="Roboto Light" panose="02000000000000000000" pitchFamily="2" charset="0"/>
+              </a:rPr>
+              <a:t> </a:t>
+            </a:r>
+            <a:r>
+              <a:rPr lang="en-US" sz="1000" dirty="0" smtClean="0">
+                <a:solidFill>
+                  <a:schemeClr val="tx1">
+                    <a:lumMod val="75000"/>
+                    <a:lumOff val="25000"/>
+                  </a:schemeClr>
+                </a:solidFill>
+                <a:latin typeface="Roboto Light" panose="02000000000000000000" pitchFamily="2" charset="0"/>
+                <a:ea typeface="Roboto Light" panose="02000000000000000000" pitchFamily="2" charset="0"/>
+              </a:rPr>
+              <a:t>                      </a:t>
+            </a:r>
+            <a:r>
+              <a:rPr lang="en-US" sz="1000" i="1" dirty="0" smtClean="0">
+                <a:solidFill>
+                  <a:schemeClr val="tx1">
+                    <a:lumMod val="75000"/>
+                    <a:lumOff val="25000"/>
+                  </a:schemeClr>
+                </a:solidFill>
+                <a:latin typeface="Roboto Light" panose="02000000000000000000" pitchFamily="2" charset="0"/>
+                <a:ea typeface="Roboto Light" panose="02000000000000000000" pitchFamily="2" charset="0"/>
+              </a:rPr>
+              <a:t>Programming</a:t>
+            </a:r>
+          </a:p>
+          <a:p>
+            <a:pPr>
+              <a:spcAft>
+                <a:spcPts val="300"/>
+              </a:spcAft>
+            </a:pPr>
+            <a:r>
+              <a:rPr lang="en-US" sz="1050" b="1" dirty="0" smtClean="0">
+                <a:latin typeface="Helvetica Neue" panose="02000503000000020004" pitchFamily="50"/>
+              </a:rPr>
+              <a:t>An open-source software for sleep data</a:t>
+            </a:r>
+            <a:endParaRPr lang="en-US" sz="1050" b="1" dirty="0">
+              <a:latin typeface="Helvetica Neue" panose="02000503000000020004" pitchFamily="50"/>
+            </a:endParaRPr>
+          </a:p>
+          <a:p>
+            <a:pPr algn="just"/>
+            <a:r>
+              <a:rPr lang="en-US" sz="1000" dirty="0" smtClean="0">
+                <a:latin typeface="Helvetica Neue" panose="02000503000000020004" pitchFamily="50"/>
+              </a:rPr>
+              <a:t>Development of an open-source Python software for visualizing, scoring and analyzing polysomnographic sleep data.</a:t>
+            </a:r>
+          </a:p>
+          <a:p>
+            <a:pPr algn="just"/>
+            <a:endParaRPr lang="en-US" sz="1000" dirty="0">
+              <a:latin typeface="Helvetica Neue" panose="02000503000000020004" pitchFamily="50"/>
+            </a:endParaRPr>
+          </a:p>
+        </p:txBody>
+      </p:sp>
+      <p:grpSp>
+        <p:nvGrpSpPr>
+          <p:cNvPr id="2" name="Groupe 1"/>
+          <p:cNvGrpSpPr/>
+          <p:nvPr/>
+        </p:nvGrpSpPr>
+        <p:grpSpPr>
+          <a:xfrm>
+            <a:off x="683640" y="459808"/>
+            <a:ext cx="5274970" cy="1138774"/>
+            <a:chOff x="683641" y="531253"/>
+            <a:chExt cx="5274970" cy="1138774"/>
+          </a:xfrm>
+          <a:solidFill>
+            <a:srgbClr val="F9FBFD"/>
+          </a:solidFill>
+          <a:effectLst>
+            <a:outerShdw blurRad="50800" dist="25400" dir="2700000" algn="tl" rotWithShape="0">
+              <a:schemeClr val="tx1">
+                <a:lumMod val="50000"/>
+                <a:lumOff val="50000"/>
+                <a:alpha val="20000"/>
+              </a:schemeClr>
+            </a:outerShdw>
+          </a:effectLst>
+        </p:grpSpPr>
+        <p:sp>
+          <p:nvSpPr>
+            <p:cNvPr id="19" name="ZoneTexte 18"/>
+            <p:cNvSpPr txBox="1"/>
+            <p:nvPr/>
+          </p:nvSpPr>
+          <p:spPr>
+            <a:xfrm>
+              <a:off x="683641" y="531254"/>
+              <a:ext cx="1701800" cy="1138773"/>
+            </a:xfrm>
+            <a:prstGeom prst="rect">
+              <a:avLst/>
+            </a:prstGeom>
+            <a:solidFill>
+              <a:srgbClr val="E7F7FD"/>
+            </a:solidFill>
+            <a:effectLst>
+              <a:outerShdw blurRad="50800" dist="38100" dir="2700000" sx="82000" sy="82000" algn="tl" rotWithShape="0">
+                <a:prstClr val="black">
+                  <a:alpha val="40000"/>
+                </a:prstClr>
+              </a:outerShdw>
+            </a:effectLst>
+          </p:spPr>
+          <p:txBody>
+            <a:bodyPr wrap="square" rtlCol="0">
+              <a:spAutoFit/>
+            </a:bodyPr>
+            <a:lstStyle/>
+            <a:p>
+              <a:pPr>
+                <a:spcAft>
+                  <a:spcPts val="600"/>
+                </a:spcAft>
+              </a:pPr>
+              <a:r>
+                <a:rPr lang="en-US" sz="1000" dirty="0">
+                  <a:latin typeface="Roboto Light" panose="02000000000000000000" pitchFamily="2" charset="0"/>
+                  <a:ea typeface="Roboto Light" panose="02000000000000000000" pitchFamily="2" charset="0"/>
+                </a:rPr>
+                <a:t>Study </a:t>
+              </a:r>
+              <a:r>
+                <a:rPr lang="en-US" sz="1000" dirty="0" smtClean="0">
+                  <a:latin typeface="Roboto Light" panose="02000000000000000000" pitchFamily="2" charset="0"/>
+                  <a:ea typeface="Roboto Light" panose="02000000000000000000" pitchFamily="2" charset="0"/>
+                </a:rPr>
+                <a:t>1 	            </a:t>
+              </a:r>
+              <a:r>
+                <a:rPr lang="en-US" sz="1000" i="1" dirty="0" smtClean="0">
+                  <a:solidFill>
+                    <a:schemeClr val="tx1">
+                      <a:lumMod val="75000"/>
+                      <a:lumOff val="25000"/>
+                    </a:schemeClr>
+                  </a:solidFill>
+                  <a:latin typeface="Roboto Light" panose="02000000000000000000" pitchFamily="2" charset="0"/>
+                  <a:ea typeface="Roboto Light" panose="02000000000000000000" pitchFamily="2" charset="0"/>
+                </a:rPr>
+                <a:t>EEG</a:t>
+              </a:r>
+              <a:endParaRPr lang="en-US" sz="1000" dirty="0" smtClean="0">
+                <a:solidFill>
+                  <a:schemeClr val="tx1">
+                    <a:lumMod val="75000"/>
+                    <a:lumOff val="25000"/>
+                  </a:schemeClr>
+                </a:solidFill>
+                <a:latin typeface="Roboto Light" panose="02000000000000000000" pitchFamily="2" charset="0"/>
+                <a:ea typeface="Roboto Light" panose="02000000000000000000" pitchFamily="2" charset="0"/>
+              </a:endParaRPr>
+            </a:p>
+            <a:p>
+              <a:pPr>
+                <a:spcAft>
+                  <a:spcPts val="300"/>
+                </a:spcAft>
+              </a:pPr>
+              <a:r>
+                <a:rPr lang="en-US" sz="1050" b="1" dirty="0" smtClean="0">
+                  <a:latin typeface="Helvetica Neue" panose="02000503000000020004" pitchFamily="50"/>
+                </a:rPr>
+                <a:t>DRF and arousals</a:t>
+              </a:r>
+              <a:endParaRPr lang="en-US" sz="1050" b="1" dirty="0">
+                <a:latin typeface="Helvetica Neue" panose="02000503000000020004" pitchFamily="50"/>
+              </a:endParaRPr>
+            </a:p>
+            <a:p>
+              <a:pPr algn="just"/>
+              <a:r>
+                <a:rPr lang="en-US" sz="1000" dirty="0">
+                  <a:latin typeface="Helvetica Neue" panose="02000503000000020004" pitchFamily="50"/>
+                </a:rPr>
+                <a:t>Are there </a:t>
+              </a:r>
+              <a:r>
+                <a:rPr lang="en-US" sz="1000" dirty="0" smtClean="0">
+                  <a:latin typeface="Helvetica Neue" panose="02000503000000020004" pitchFamily="50"/>
+                </a:rPr>
+                <a:t>differences in arousals between high and low dream recallers?</a:t>
+              </a:r>
+            </a:p>
+            <a:p>
+              <a:pPr algn="just"/>
+              <a:endParaRPr lang="en-US" sz="1000" dirty="0" smtClean="0">
+                <a:latin typeface="Helvetica Neue" panose="02000503000000020004" pitchFamily="50"/>
+              </a:endParaRPr>
+            </a:p>
+          </p:txBody>
+        </p:sp>
+        <p:sp>
+          <p:nvSpPr>
+            <p:cNvPr id="27" name="ZoneTexte 26"/>
+            <p:cNvSpPr txBox="1"/>
+            <p:nvPr/>
+          </p:nvSpPr>
+          <p:spPr>
+            <a:xfrm>
+              <a:off x="2470226" y="531253"/>
+              <a:ext cx="1701800" cy="1138773"/>
+            </a:xfrm>
+            <a:prstGeom prst="rect">
+              <a:avLst/>
+            </a:prstGeom>
+            <a:solidFill>
+              <a:srgbClr val="C7ECF9"/>
+            </a:solidFill>
+            <a:effectLst>
+              <a:outerShdw blurRad="50800" dist="38100" dir="2700000" sx="82000" sy="82000" algn="tl" rotWithShape="0">
+                <a:prstClr val="black">
+                  <a:alpha val="40000"/>
+                </a:prstClr>
+              </a:outerShdw>
+            </a:effectLst>
+          </p:spPr>
+          <p:txBody>
+            <a:bodyPr wrap="square" rtlCol="0">
+              <a:spAutoFit/>
+            </a:bodyPr>
+            <a:lstStyle/>
+            <a:p>
+              <a:pPr>
+                <a:spcAft>
+                  <a:spcPts val="600"/>
+                </a:spcAft>
+              </a:pPr>
+              <a:r>
+                <a:rPr lang="en-US" sz="1000" dirty="0">
+                  <a:latin typeface="Roboto Light" panose="02000000000000000000" pitchFamily="2" charset="0"/>
+                  <a:ea typeface="Roboto Light" panose="02000000000000000000" pitchFamily="2" charset="0"/>
+                </a:rPr>
+                <a:t>Study </a:t>
+              </a:r>
+              <a:r>
+                <a:rPr lang="en-US" sz="1000" dirty="0" smtClean="0">
+                  <a:latin typeface="Roboto Light" panose="02000000000000000000" pitchFamily="2" charset="0"/>
+                  <a:ea typeface="Roboto Light" panose="02000000000000000000" pitchFamily="2" charset="0"/>
+                </a:rPr>
+                <a:t>2	  </a:t>
+              </a:r>
+              <a:r>
+                <a:rPr lang="en-US" sz="1000" i="1" dirty="0" smtClean="0">
+                  <a:solidFill>
+                    <a:schemeClr val="tx1">
+                      <a:lumMod val="75000"/>
+                      <a:lumOff val="25000"/>
+                    </a:schemeClr>
+                  </a:solidFill>
+                  <a:latin typeface="Roboto Light" panose="02000000000000000000" pitchFamily="2" charset="0"/>
+                  <a:ea typeface="Roboto Light" panose="02000000000000000000" pitchFamily="2" charset="0"/>
+                </a:rPr>
+                <a:t>EEG-fMRI</a:t>
+              </a:r>
+            </a:p>
+            <a:p>
+              <a:pPr>
+                <a:spcAft>
+                  <a:spcPts val="300"/>
+                </a:spcAft>
+              </a:pPr>
+              <a:r>
+                <a:rPr lang="en-US" sz="1050" b="1" dirty="0" smtClean="0">
+                  <a:latin typeface="Helvetica Neue" panose="02000503000000020004" pitchFamily="50"/>
+                </a:rPr>
+                <a:t>DRF and sleep inertia</a:t>
+              </a:r>
+              <a:endParaRPr lang="en-US" sz="1050" b="1" dirty="0">
+                <a:latin typeface="Helvetica Neue" panose="02000503000000020004" pitchFamily="50"/>
+              </a:endParaRPr>
+            </a:p>
+            <a:p>
+              <a:pPr algn="just"/>
+              <a:r>
+                <a:rPr lang="en-US" sz="1000" dirty="0">
+                  <a:latin typeface="Helvetica Neue" panose="02000503000000020004" pitchFamily="50"/>
+                </a:rPr>
+                <a:t>Are there differences in sleep </a:t>
+              </a:r>
+              <a:r>
+                <a:rPr lang="en-US" sz="1000" dirty="0" smtClean="0">
+                  <a:latin typeface="Helvetica Neue" panose="02000503000000020004" pitchFamily="50"/>
+                </a:rPr>
+                <a:t>inertia between high and low dream recallers?</a:t>
+              </a:r>
+            </a:p>
+            <a:p>
+              <a:endParaRPr lang="en-US" sz="1000" dirty="0">
+                <a:latin typeface="Helvetica Neue" panose="02000503000000020004" pitchFamily="50"/>
+              </a:endParaRPr>
+            </a:p>
+          </p:txBody>
+        </p:sp>
+        <p:sp>
+          <p:nvSpPr>
+            <p:cNvPr id="36" name="ZoneTexte 35"/>
+            <p:cNvSpPr txBox="1"/>
+            <p:nvPr/>
+          </p:nvSpPr>
+          <p:spPr>
+            <a:xfrm>
+              <a:off x="4256811" y="531253"/>
+              <a:ext cx="1701800" cy="1138773"/>
+            </a:xfrm>
+            <a:prstGeom prst="rect">
+              <a:avLst/>
+            </a:prstGeom>
+            <a:solidFill>
+              <a:srgbClr val="9DDEF5"/>
+            </a:solidFill>
+            <a:effectLst>
+              <a:outerShdw blurRad="50800" dist="38100" dir="2700000" sx="82000" sy="82000" algn="tl" rotWithShape="0">
+                <a:prstClr val="black">
+                  <a:alpha val="40000"/>
+                </a:prstClr>
+              </a:outerShdw>
+            </a:effectLst>
+          </p:spPr>
+          <p:txBody>
+            <a:bodyPr wrap="square" rtlCol="0">
+              <a:spAutoFit/>
+            </a:bodyPr>
+            <a:lstStyle/>
+            <a:p>
+              <a:pPr>
+                <a:spcAft>
+                  <a:spcPts val="600"/>
+                </a:spcAft>
+              </a:pPr>
+              <a:r>
+                <a:rPr lang="en-US" sz="1000" dirty="0">
+                  <a:latin typeface="Roboto Light" panose="02000000000000000000" pitchFamily="2" charset="0"/>
+                  <a:ea typeface="Roboto Light" panose="02000000000000000000" pitchFamily="2" charset="0"/>
+                </a:rPr>
+                <a:t>Study </a:t>
+              </a:r>
+              <a:r>
+                <a:rPr lang="en-US" sz="1000" dirty="0" smtClean="0">
+                  <a:latin typeface="Roboto Light" panose="02000000000000000000" pitchFamily="2" charset="0"/>
+                  <a:ea typeface="Roboto Light" panose="02000000000000000000" pitchFamily="2" charset="0"/>
+                </a:rPr>
+                <a:t>3 	       </a:t>
+              </a:r>
+              <a:r>
+                <a:rPr lang="en-US" sz="1000" i="1" dirty="0" smtClean="0">
+                  <a:solidFill>
+                    <a:schemeClr val="tx1">
+                      <a:lumMod val="75000"/>
+                      <a:lumOff val="25000"/>
+                    </a:schemeClr>
+                  </a:solidFill>
+                  <a:latin typeface="Roboto Light" panose="02000000000000000000" pitchFamily="2" charset="0"/>
+                  <a:ea typeface="Roboto Light" panose="02000000000000000000" pitchFamily="2" charset="0"/>
+                </a:rPr>
+                <a:t>Survey</a:t>
+              </a:r>
+            </a:p>
+            <a:p>
+              <a:pPr>
+                <a:spcAft>
+                  <a:spcPts val="300"/>
+                </a:spcAft>
+              </a:pPr>
+              <a:r>
+                <a:rPr lang="en-US" sz="1050" b="1" dirty="0" smtClean="0">
+                  <a:latin typeface="Helvetica Neue" panose="02000503000000020004" pitchFamily="50"/>
+                </a:rPr>
+                <a:t>Sleep and dream habits</a:t>
+              </a:r>
+            </a:p>
+            <a:p>
+              <a:pPr algn="just">
+                <a:spcAft>
+                  <a:spcPts val="300"/>
+                </a:spcAft>
+              </a:pPr>
+              <a:r>
+                <a:rPr lang="en-US" sz="1000" dirty="0" smtClean="0">
+                  <a:latin typeface="Helvetica Neue" panose="02000503000000020004" pitchFamily="50"/>
+                </a:rPr>
+                <a:t>Survey of the sleep and dream habits of a large sample of French college students.</a:t>
+              </a:r>
+              <a:endParaRPr lang="en-US" sz="1000" dirty="0">
+                <a:latin typeface="Helvetica Neue" panose="02000503000000020004" pitchFamily="50"/>
+              </a:endParaRPr>
+            </a:p>
+          </p:txBody>
+        </p:sp>
+      </p:grpSp>
+      <p:sp>
+        <p:nvSpPr>
+          <p:cNvPr id="37" name="ZoneTexte 36"/>
+          <p:cNvSpPr txBox="1"/>
+          <p:nvPr/>
+        </p:nvSpPr>
+        <p:spPr>
+          <a:xfrm>
+            <a:off x="683640" y="1943752"/>
+            <a:ext cx="3488385" cy="1138773"/>
+          </a:xfrm>
+          <a:prstGeom prst="rect">
+            <a:avLst/>
+          </a:prstGeom>
+          <a:solidFill>
+            <a:srgbClr val="FFDCCD"/>
+          </a:solidFill>
+          <a:effectLst>
+            <a:outerShdw blurRad="50800" dist="25400" dir="2700000" algn="tl" rotWithShape="0">
+              <a:schemeClr val="tx1">
+                <a:lumMod val="50000"/>
+                <a:lumOff val="50000"/>
+                <a:alpha val="20000"/>
+              </a:schemeClr>
+            </a:outerShdw>
+          </a:effectLst>
+        </p:spPr>
+        <p:txBody>
+          <a:bodyPr wrap="square" rtlCol="0">
+            <a:spAutoFit/>
+          </a:bodyPr>
+          <a:lstStyle/>
+          <a:p>
+            <a:pPr>
+              <a:spcAft>
+                <a:spcPts val="600"/>
+              </a:spcAft>
+            </a:pPr>
+            <a:r>
+              <a:rPr lang="en-US" sz="1000" dirty="0">
+                <a:latin typeface="Roboto Light" panose="02000000000000000000" pitchFamily="2" charset="0"/>
+                <a:ea typeface="Roboto Light" panose="02000000000000000000" pitchFamily="2" charset="0"/>
+              </a:rPr>
+              <a:t>Study </a:t>
+            </a:r>
+            <a:r>
+              <a:rPr lang="en-US" sz="1000" dirty="0" smtClean="0">
+                <a:latin typeface="Roboto Light" panose="02000000000000000000" pitchFamily="2" charset="0"/>
+                <a:ea typeface="Roboto Light" panose="02000000000000000000" pitchFamily="2" charset="0"/>
+              </a:rPr>
+              <a:t>4			</a:t>
+            </a:r>
+            <a:r>
+              <a:rPr lang="en-US" sz="1000" dirty="0" smtClean="0">
+                <a:solidFill>
+                  <a:schemeClr val="tx1">
+                    <a:lumMod val="75000"/>
+                    <a:lumOff val="25000"/>
+                  </a:schemeClr>
+                </a:solidFill>
+                <a:latin typeface="Roboto Light" panose="02000000000000000000" pitchFamily="2" charset="0"/>
+                <a:ea typeface="Roboto Light" panose="02000000000000000000" pitchFamily="2" charset="0"/>
+              </a:rPr>
+              <a:t>  </a:t>
+            </a:r>
+            <a:r>
+              <a:rPr lang="en-US" sz="1000" i="1" dirty="0" smtClean="0">
+                <a:solidFill>
+                  <a:schemeClr val="tx1">
+                    <a:lumMod val="75000"/>
+                    <a:lumOff val="25000"/>
+                  </a:schemeClr>
+                </a:solidFill>
+                <a:latin typeface="Roboto Light" panose="02000000000000000000" pitchFamily="2" charset="0"/>
+                <a:ea typeface="Roboto Light" panose="02000000000000000000" pitchFamily="2" charset="0"/>
+              </a:rPr>
+              <a:t>Behavior </a:t>
+            </a:r>
+            <a:r>
+              <a:rPr lang="en-US" sz="1000" dirty="0" smtClean="0">
+                <a:solidFill>
+                  <a:schemeClr val="tx1">
+                    <a:lumMod val="75000"/>
+                    <a:lumOff val="25000"/>
+                  </a:schemeClr>
+                </a:solidFill>
+                <a:latin typeface="Roboto Light" panose="02000000000000000000" pitchFamily="2" charset="0"/>
+                <a:ea typeface="Roboto Light" panose="02000000000000000000" pitchFamily="2" charset="0"/>
+              </a:rPr>
+              <a:t> </a:t>
+            </a:r>
+          </a:p>
+          <a:p>
+            <a:pPr>
+              <a:spcAft>
+                <a:spcPts val="300"/>
+              </a:spcAft>
+            </a:pPr>
+            <a:r>
+              <a:rPr lang="en-US" sz="1050" b="1" dirty="0" smtClean="0">
+                <a:latin typeface="Helvetica Neue" panose="02000503000000020004" pitchFamily="50"/>
+              </a:rPr>
+              <a:t>The memory sources of dreams</a:t>
+            </a:r>
+            <a:endParaRPr lang="en-US" sz="1050" b="1" dirty="0">
+              <a:latin typeface="Helvetica Neue" panose="02000503000000020004" pitchFamily="50"/>
+            </a:endParaRPr>
+          </a:p>
+          <a:p>
+            <a:r>
+              <a:rPr lang="en-US" sz="1000" dirty="0" smtClean="0">
+                <a:latin typeface="Helvetica Neue" panose="02000503000000020004" pitchFamily="50"/>
+              </a:rPr>
+              <a:t>Investigation of the characteristics of the memory sources incorporated into dreams, especially remote and trivial memories.</a:t>
+            </a:r>
+          </a:p>
+          <a:p>
+            <a:endParaRPr lang="en-US" sz="1000" dirty="0" smtClean="0">
+              <a:latin typeface="Helvetica Neue" panose="02000503000000020004" pitchFamily="50"/>
+            </a:endParaRPr>
+          </a:p>
+        </p:txBody>
+      </p:sp>
+      <p:cxnSp>
+        <p:nvCxnSpPr>
+          <p:cNvPr id="16" name="Connecteur droit 15"/>
+          <p:cNvCxnSpPr/>
+          <p:nvPr/>
+        </p:nvCxnSpPr>
+        <p:spPr>
+          <a:xfrm>
+            <a:off x="66054" y="1765530"/>
+            <a:ext cx="5940000" cy="0"/>
+          </a:xfrm>
+          <a:prstGeom prst="line">
+            <a:avLst/>
+          </a:prstGeom>
+          <a:ln w="12700">
+            <a:solidFill>
+              <a:srgbClr val="1D1F21"/>
+            </a:solidFill>
+            <a:prstDash val="sysDot"/>
+          </a:ln>
+        </p:spPr>
+        <p:style>
+          <a:lnRef idx="1">
+            <a:schemeClr val="dk1"/>
+          </a:lnRef>
+          <a:fillRef idx="0">
+            <a:schemeClr val="dk1"/>
+          </a:fillRef>
+          <a:effectRef idx="0">
+            <a:schemeClr val="dk1"/>
+          </a:effectRef>
+          <a:fontRef idx="minor">
+            <a:schemeClr val="tx1"/>
+          </a:fontRef>
+        </p:style>
+      </p:cxnSp>
+      <p:cxnSp>
+        <p:nvCxnSpPr>
+          <p:cNvPr id="24" name="Connecteur droit 23"/>
+          <p:cNvCxnSpPr/>
+          <p:nvPr/>
+        </p:nvCxnSpPr>
+        <p:spPr>
+          <a:xfrm>
+            <a:off x="66054" y="3260240"/>
+            <a:ext cx="5940000" cy="0"/>
+          </a:xfrm>
+          <a:prstGeom prst="line">
+            <a:avLst/>
+          </a:prstGeom>
+          <a:ln w="12700">
+            <a:solidFill>
+              <a:srgbClr val="1D1F21"/>
+            </a:solidFill>
+            <a:prstDash val="sysDot"/>
+          </a:ln>
+        </p:spPr>
+        <p:style>
+          <a:lnRef idx="1">
+            <a:schemeClr val="dk1"/>
+          </a:lnRef>
+          <a:fillRef idx="0">
+            <a:schemeClr val="dk1"/>
+          </a:fillRef>
+          <a:effectRef idx="0">
+            <a:schemeClr val="dk1"/>
+          </a:effectRef>
+          <a:fontRef idx="minor">
+            <a:schemeClr val="tx1"/>
+          </a:fontRef>
+        </p:style>
+      </p:cxnSp>
+    </p:spTree>
+    <p:extLst>
+      <p:ext uri="{BB962C8B-B14F-4D97-AF65-F5344CB8AC3E}">
+        <p14:creationId xmlns:p14="http://schemas.microsoft.com/office/powerpoint/2010/main" val="4203217391"/>
+      </p:ext>
+    </p:extLst>
+  </p:cSld>
+  <p:clrMapOvr>
+    <a:masterClrMapping/>
+  </p:clrMapOvr>
+  <p:timing>
+    <p:tnLst>
+      <p:par>
+        <p:cTn id="1" dur="indefinite" restart="never" nodeType="tmRoot"/>
+      </p:par>
+    </p:tnLst>
+  </p:timing>
+</p:sld>
+</file>
+
+<file path=ppt/slides/slide3.xml><?xml version="1.0" encoding="utf-8"?>
+<p:sld xmlns:a="http://schemas.openxmlformats.org/drawingml/2006/main" xmlns:r="http://schemas.openxmlformats.org/officeDocument/2006/relationships" xmlns:p="http://schemas.openxmlformats.org/presentationml/2006/main">
+  <p:cSld>
+    <p:spTree>
+      <p:nvGrpSpPr>
+        <p:cNvPr id="1" name=""/>
+        <p:cNvGrpSpPr/>
+        <p:nvPr/>
+      </p:nvGrpSpPr>
+      <p:grpSpPr>
+        <a:xfrm>
+          <a:off x="0" y="0"/>
+          <a:ext cx="0" cy="0"/>
+          <a:chOff x="0" y="0"/>
+          <a:chExt cx="0" cy="0"/>
+        </a:xfrm>
+      </p:grpSpPr>
+      <p:sp>
+        <p:nvSpPr>
+          <p:cNvPr id="3" name="Rectangle à coins arrondis 2"/>
+          <p:cNvSpPr/>
+          <p:nvPr/>
+        </p:nvSpPr>
+        <p:spPr>
+          <a:xfrm>
+            <a:off x="66054" y="359348"/>
+            <a:ext cx="532801" cy="4311161"/>
+          </a:xfrm>
+          <a:prstGeom prst="roundRect">
+            <a:avLst>
+              <a:gd name="adj" fmla="val 10645"/>
+            </a:avLst>
+          </a:prstGeom>
+          <a:gradFill flip="none" rotWithShape="1">
+            <a:gsLst>
+              <a:gs pos="11000">
+                <a:srgbClr val="061229"/>
+              </a:gs>
+              <a:gs pos="44000">
+                <a:srgbClr val="717885"/>
+              </a:gs>
+              <a:gs pos="73000">
+                <a:srgbClr val="DBDDE0"/>
+              </a:gs>
+            </a:gsLst>
+            <a:lin ang="16200000" scaled="1"/>
+            <a:tileRect/>
+          </a:gradFill>
+          <a:ln>
+            <a:noFill/>
+          </a:ln>
+          <a:effectLst>
+            <a:outerShdw blurRad="25400" dist="25400" dir="2700000" algn="tl" rotWithShape="0">
+              <a:schemeClr val="tx1">
+                <a:lumMod val="50000"/>
+                <a:lumOff val="50000"/>
+                <a:alpha val="70000"/>
+              </a:schemeClr>
+            </a:outerShdw>
+          </a:effectLst>
+        </p:spPr>
+        <p:style>
+          <a:lnRef idx="2">
+            <a:schemeClr val="accent1">
+              <a:shade val="50000"/>
+            </a:schemeClr>
+          </a:lnRef>
+          <a:fillRef idx="1">
+            <a:schemeClr val="accent1"/>
+          </a:fillRef>
+          <a:effectRef idx="0">
+            <a:schemeClr val="accent1"/>
+          </a:effectRef>
+          <a:fontRef idx="minor">
+            <a:schemeClr val="lt1"/>
+          </a:fontRef>
+        </p:style>
+        <p:txBody>
+          <a:bodyPr rtlCol="0" anchor="ctr"/>
+          <a:lstStyle/>
+          <a:p>
+            <a:pPr algn="ctr"/>
+            <a:endParaRPr lang="en-US"/>
+          </a:p>
+        </p:txBody>
+      </p:sp>
+      <p:sp>
+        <p:nvSpPr>
+          <p:cNvPr id="8" name="ZoneTexte 7"/>
+          <p:cNvSpPr txBox="1"/>
+          <p:nvPr/>
+        </p:nvSpPr>
+        <p:spPr>
+          <a:xfrm>
+            <a:off x="67941" y="359348"/>
+            <a:ext cx="530915" cy="1332000"/>
+          </a:xfrm>
+          <a:prstGeom prst="rect">
+            <a:avLst/>
+          </a:prstGeom>
+          <a:noFill/>
+          <a:ln>
+            <a:noFill/>
+          </a:ln>
+        </p:spPr>
+        <p:txBody>
+          <a:bodyPr vert="vert270" wrap="square" rtlCol="0">
+            <a:spAutoFit/>
+          </a:bodyPr>
+          <a:lstStyle/>
+          <a:p>
+            <a:pPr algn="ctr">
+              <a:spcAft>
+                <a:spcPts val="300"/>
+              </a:spcAft>
+            </a:pPr>
+            <a:r>
+              <a:rPr lang="en-US" sz="1000" b="1" dirty="0">
+                <a:solidFill>
+                  <a:srgbClr val="061229"/>
+                </a:solidFill>
+                <a:latin typeface="Helvetica Neue" panose="02000503000000020004" pitchFamily="50"/>
+                <a:ea typeface="Roboto" pitchFamily="2" charset="0"/>
+                <a:cs typeface="Times New Roman" panose="02020603050405020304" pitchFamily="18" charset="0"/>
+              </a:rPr>
+              <a:t>DREAM RECALL </a:t>
+            </a:r>
+            <a:endParaRPr lang="en-US" sz="1000" b="1" dirty="0" smtClean="0">
+              <a:solidFill>
+                <a:srgbClr val="061229"/>
+              </a:solidFill>
+              <a:latin typeface="Helvetica Neue" panose="02000503000000020004" pitchFamily="50"/>
+              <a:ea typeface="Roboto" pitchFamily="2" charset="0"/>
+              <a:cs typeface="Times New Roman" panose="02020603050405020304" pitchFamily="18" charset="0"/>
+            </a:endParaRPr>
+          </a:p>
+          <a:p>
+            <a:pPr algn="ctr">
+              <a:spcAft>
+                <a:spcPts val="300"/>
+              </a:spcAft>
+            </a:pPr>
+            <a:r>
+              <a:rPr lang="en-US" sz="1000" b="1" dirty="0" smtClean="0">
+                <a:solidFill>
+                  <a:srgbClr val="061229"/>
+                </a:solidFill>
+                <a:latin typeface="Helvetica Neue" panose="02000503000000020004" pitchFamily="50"/>
+                <a:ea typeface="Roboto" pitchFamily="2" charset="0"/>
+                <a:cs typeface="Times New Roman" panose="02020603050405020304" pitchFamily="18" charset="0"/>
+              </a:rPr>
+              <a:t>FREQUENCY</a:t>
+            </a:r>
+            <a:endParaRPr lang="en-US" sz="1000" b="1" dirty="0">
+              <a:solidFill>
+                <a:srgbClr val="061229"/>
+              </a:solidFill>
+              <a:latin typeface="Helvetica Neue" panose="02000503000000020004" pitchFamily="50"/>
+              <a:ea typeface="Roboto" pitchFamily="2" charset="0"/>
+              <a:cs typeface="Times New Roman" panose="02020603050405020304" pitchFamily="18" charset="0"/>
+            </a:endParaRPr>
+          </a:p>
+        </p:txBody>
+      </p:sp>
+      <p:sp>
+        <p:nvSpPr>
+          <p:cNvPr id="20" name="ZoneTexte 19"/>
+          <p:cNvSpPr txBox="1"/>
+          <p:nvPr/>
+        </p:nvSpPr>
+        <p:spPr>
+          <a:xfrm>
+            <a:off x="67941" y="1847139"/>
+            <a:ext cx="530915" cy="1332000"/>
+          </a:xfrm>
+          <a:prstGeom prst="rect">
+            <a:avLst/>
+          </a:prstGeom>
+          <a:noFill/>
+          <a:ln>
+            <a:noFill/>
+          </a:ln>
+        </p:spPr>
+        <p:txBody>
+          <a:bodyPr vert="vert270" wrap="square" rtlCol="0">
+            <a:spAutoFit/>
+          </a:bodyPr>
+          <a:lstStyle/>
+          <a:p>
+            <a:pPr algn="ctr">
+              <a:spcAft>
+                <a:spcPts val="300"/>
+              </a:spcAft>
+            </a:pPr>
+            <a:r>
+              <a:rPr lang="en-US" sz="1000" b="1" dirty="0" smtClean="0">
+                <a:solidFill>
+                  <a:srgbClr val="FFFFFF"/>
+                </a:solidFill>
+                <a:latin typeface="Helvetica Neue" panose="02000503000000020004" pitchFamily="50"/>
+                <a:ea typeface="Roboto" pitchFamily="2" charset="0"/>
+                <a:cs typeface="Times New Roman" panose="02020603050405020304" pitchFamily="18" charset="0"/>
+              </a:rPr>
+              <a:t>DREAM </a:t>
+            </a:r>
+          </a:p>
+          <a:p>
+            <a:pPr algn="ctr">
+              <a:spcAft>
+                <a:spcPts val="300"/>
+              </a:spcAft>
+            </a:pPr>
+            <a:r>
+              <a:rPr lang="en-US" sz="1000" b="1" dirty="0" smtClean="0">
+                <a:solidFill>
+                  <a:srgbClr val="FFFFFF"/>
+                </a:solidFill>
+                <a:latin typeface="Helvetica Neue" panose="02000503000000020004" pitchFamily="50"/>
+                <a:ea typeface="Roboto" pitchFamily="2" charset="0"/>
+                <a:cs typeface="Times New Roman" panose="02020603050405020304" pitchFamily="18" charset="0"/>
+              </a:rPr>
+              <a:t>CONTENT</a:t>
+            </a:r>
+            <a:endParaRPr lang="en-US" sz="1000" b="1" dirty="0">
+              <a:solidFill>
+                <a:srgbClr val="FFFFFF"/>
+              </a:solidFill>
+              <a:latin typeface="Helvetica Neue" panose="02000503000000020004" pitchFamily="50"/>
+              <a:ea typeface="Roboto" pitchFamily="2" charset="0"/>
+              <a:cs typeface="Times New Roman" panose="02020603050405020304" pitchFamily="18" charset="0"/>
+            </a:endParaRPr>
+          </a:p>
+        </p:txBody>
+      </p:sp>
+      <p:sp>
+        <p:nvSpPr>
+          <p:cNvPr id="22" name="ZoneTexte 21"/>
+          <p:cNvSpPr txBox="1"/>
+          <p:nvPr/>
+        </p:nvSpPr>
+        <p:spPr>
+          <a:xfrm>
+            <a:off x="66055" y="3338509"/>
+            <a:ext cx="492443" cy="1332000"/>
+          </a:xfrm>
+          <a:prstGeom prst="rect">
+            <a:avLst/>
+          </a:prstGeom>
+          <a:noFill/>
+          <a:ln>
+            <a:noFill/>
+          </a:ln>
+        </p:spPr>
+        <p:txBody>
+          <a:bodyPr vert="vert270" wrap="square" rtlCol="0">
+            <a:spAutoFit/>
+          </a:bodyPr>
+          <a:lstStyle/>
+          <a:p>
+            <a:pPr algn="ctr">
+              <a:spcAft>
+                <a:spcPts val="300"/>
+              </a:spcAft>
+            </a:pPr>
+            <a:r>
+              <a:rPr lang="en-US" sz="1000" b="1" dirty="0" smtClean="0">
+                <a:solidFill>
+                  <a:srgbClr val="FFFFFF"/>
+                </a:solidFill>
+                <a:latin typeface="Helvetica Neue" panose="02000503000000020004" pitchFamily="50"/>
+                <a:ea typeface="Roboto" pitchFamily="2" charset="0"/>
+                <a:cs typeface="Times New Roman" panose="02020603050405020304" pitchFamily="18" charset="0"/>
+              </a:rPr>
+              <a:t>SOFTWARE DEVELOPEMENT</a:t>
+            </a:r>
+            <a:endParaRPr lang="en-US" sz="1000" b="1" dirty="0">
+              <a:solidFill>
+                <a:srgbClr val="FFFFFF"/>
+              </a:solidFill>
+              <a:latin typeface="Helvetica Neue" panose="02000503000000020004" pitchFamily="50"/>
+              <a:ea typeface="Roboto" pitchFamily="2" charset="0"/>
+              <a:cs typeface="Times New Roman" panose="02020603050405020304" pitchFamily="18" charset="0"/>
+            </a:endParaRPr>
+          </a:p>
+        </p:txBody>
+      </p:sp>
+      <p:sp>
+        <p:nvSpPr>
+          <p:cNvPr id="34" name="ZoneTexte 33"/>
+          <p:cNvSpPr txBox="1"/>
+          <p:nvPr/>
+        </p:nvSpPr>
+        <p:spPr>
+          <a:xfrm>
+            <a:off x="683640" y="3438969"/>
+            <a:ext cx="5274969" cy="1138773"/>
+          </a:xfrm>
+          <a:prstGeom prst="rect">
+            <a:avLst/>
+          </a:prstGeom>
+          <a:solidFill>
+            <a:srgbClr val="A2D2C8"/>
+          </a:solidFill>
+          <a:effectLst>
+            <a:outerShdw blurRad="50800" dist="25400" dir="2700000" algn="tl" rotWithShape="0">
+              <a:schemeClr val="tx1">
+                <a:lumMod val="50000"/>
+                <a:lumOff val="50000"/>
+                <a:alpha val="20000"/>
+              </a:schemeClr>
+            </a:outerShdw>
+          </a:effectLst>
+        </p:spPr>
+        <p:txBody>
+          <a:bodyPr wrap="square" rtlCol="0">
+            <a:spAutoFit/>
+          </a:bodyPr>
+          <a:lstStyle/>
+          <a:p>
+            <a:pPr>
+              <a:spcAft>
+                <a:spcPts val="600"/>
+              </a:spcAft>
+            </a:pPr>
+            <a:r>
+              <a:rPr lang="en-US" sz="1000" dirty="0">
+                <a:latin typeface="Roboto Light" panose="02000000000000000000" pitchFamily="2" charset="0"/>
+                <a:ea typeface="Roboto Light" panose="02000000000000000000" pitchFamily="2" charset="0"/>
+              </a:rPr>
+              <a:t>Study </a:t>
+            </a:r>
+            <a:r>
+              <a:rPr lang="en-US" sz="1000" dirty="0" smtClean="0">
+                <a:latin typeface="Roboto Light" panose="02000000000000000000" pitchFamily="2" charset="0"/>
+                <a:ea typeface="Roboto Light" panose="02000000000000000000" pitchFamily="2" charset="0"/>
+              </a:rPr>
+              <a:t>5		</a:t>
+            </a:r>
+            <a:r>
+              <a:rPr lang="en-US" sz="1000" dirty="0">
+                <a:solidFill>
+                  <a:schemeClr val="tx1">
+                    <a:lumMod val="75000"/>
+                    <a:lumOff val="25000"/>
+                  </a:schemeClr>
+                </a:solidFill>
+                <a:latin typeface="Roboto Light" panose="02000000000000000000" pitchFamily="2" charset="0"/>
+                <a:ea typeface="Roboto Light" panose="02000000000000000000" pitchFamily="2" charset="0"/>
+              </a:rPr>
+              <a:t> </a:t>
+            </a:r>
+            <a:r>
+              <a:rPr lang="en-US" sz="1000" dirty="0" smtClean="0">
+                <a:solidFill>
+                  <a:schemeClr val="tx1">
+                    <a:lumMod val="75000"/>
+                    <a:lumOff val="25000"/>
+                  </a:schemeClr>
+                </a:solidFill>
+                <a:latin typeface="Roboto Light" panose="02000000000000000000" pitchFamily="2" charset="0"/>
+                <a:ea typeface="Roboto Light" panose="02000000000000000000" pitchFamily="2" charset="0"/>
+              </a:rPr>
+              <a:t>                      </a:t>
+            </a:r>
+            <a:r>
+              <a:rPr lang="en-US" sz="1000" dirty="0" smtClean="0">
+                <a:solidFill>
+                  <a:schemeClr val="tx1">
+                    <a:lumMod val="75000"/>
+                    <a:lumOff val="25000"/>
+                  </a:schemeClr>
+                </a:solidFill>
+                <a:latin typeface="Roboto Light" panose="02000000000000000000" pitchFamily="2" charset="0"/>
+                <a:ea typeface="Roboto Light" panose="02000000000000000000" pitchFamily="2" charset="0"/>
+              </a:rPr>
+              <a:t> 	 	                      </a:t>
+            </a:r>
+            <a:r>
+              <a:rPr lang="en-US" sz="1000" i="1" dirty="0" smtClean="0">
+                <a:solidFill>
+                  <a:schemeClr val="tx1">
+                    <a:lumMod val="75000"/>
+                    <a:lumOff val="25000"/>
+                  </a:schemeClr>
+                </a:solidFill>
+                <a:latin typeface="Roboto Light" panose="02000000000000000000" pitchFamily="2" charset="0"/>
+                <a:ea typeface="Roboto Light" panose="02000000000000000000" pitchFamily="2" charset="0"/>
+              </a:rPr>
+              <a:t>Programming</a:t>
+            </a:r>
+            <a:endParaRPr lang="en-US" sz="1000" i="1" dirty="0" smtClean="0">
+              <a:solidFill>
+                <a:schemeClr val="tx1">
+                  <a:lumMod val="75000"/>
+                  <a:lumOff val="25000"/>
+                </a:schemeClr>
+              </a:solidFill>
+              <a:latin typeface="Roboto Light" panose="02000000000000000000" pitchFamily="2" charset="0"/>
+              <a:ea typeface="Roboto Light" panose="02000000000000000000" pitchFamily="2" charset="0"/>
+            </a:endParaRPr>
+          </a:p>
+          <a:p>
+            <a:pPr>
+              <a:spcAft>
+                <a:spcPts val="300"/>
+              </a:spcAft>
+            </a:pPr>
+            <a:r>
+              <a:rPr lang="en-US" sz="1050" b="1" dirty="0" smtClean="0">
+                <a:latin typeface="Helvetica Neue" panose="02000503000000020004" pitchFamily="50"/>
+              </a:rPr>
+              <a:t>An open-source software for sleep data</a:t>
+            </a:r>
+            <a:endParaRPr lang="en-US" sz="1050" b="1" dirty="0">
+              <a:latin typeface="Helvetica Neue" panose="02000503000000020004" pitchFamily="50"/>
+            </a:endParaRPr>
+          </a:p>
+          <a:p>
+            <a:pPr algn="just"/>
+            <a:r>
+              <a:rPr lang="en-US" sz="1000" dirty="0" smtClean="0">
+                <a:latin typeface="Helvetica Neue" panose="02000503000000020004" pitchFamily="50"/>
+              </a:rPr>
+              <a:t>There is a lack of free and </a:t>
+            </a:r>
+            <a:r>
+              <a:rPr lang="en-US" sz="1000" dirty="0">
+                <a:latin typeface="Helvetica Neue" panose="02000503000000020004" pitchFamily="50"/>
+              </a:rPr>
+              <a:t>easy-to-use </a:t>
+            </a:r>
+            <a:r>
+              <a:rPr lang="en-US" sz="1000" dirty="0" smtClean="0">
+                <a:latin typeface="Helvetica Neue" panose="02000503000000020004" pitchFamily="50"/>
+              </a:rPr>
+              <a:t>graphical user interface dedicated to sleep data visualization, scoring and analysis. To fill this gap, we developed an </a:t>
+            </a:r>
+            <a:r>
+              <a:rPr lang="en-US" sz="1000" dirty="0" smtClean="0">
+                <a:latin typeface="Helvetica Neue" panose="02000503000000020004" pitchFamily="50"/>
+              </a:rPr>
+              <a:t>open-source </a:t>
+            </a:r>
+            <a:r>
+              <a:rPr lang="en-US" sz="1000" dirty="0" smtClean="0">
+                <a:latin typeface="Helvetica Neue" panose="02000503000000020004" pitchFamily="50"/>
+              </a:rPr>
+              <a:t>Python </a:t>
+            </a:r>
+            <a:r>
+              <a:rPr lang="en-US" sz="1000" dirty="0" smtClean="0">
+                <a:latin typeface="Helvetica Neue" panose="02000503000000020004" pitchFamily="50"/>
+              </a:rPr>
+              <a:t>software capable of handling efficiently large datasets from several file formats, and integrating automatic detection of several sleep microstructural features.</a:t>
+            </a:r>
+            <a:endParaRPr lang="en-US" sz="1000" dirty="0">
+              <a:latin typeface="Helvetica Neue" panose="02000503000000020004" pitchFamily="50"/>
+            </a:endParaRPr>
+          </a:p>
+        </p:txBody>
+      </p:sp>
+      <p:grpSp>
+        <p:nvGrpSpPr>
+          <p:cNvPr id="2" name="Groupe 1"/>
+          <p:cNvGrpSpPr/>
+          <p:nvPr/>
+        </p:nvGrpSpPr>
+        <p:grpSpPr>
+          <a:xfrm>
+            <a:off x="683640" y="459808"/>
+            <a:ext cx="5274970" cy="1138774"/>
+            <a:chOff x="683641" y="531253"/>
+            <a:chExt cx="5274970" cy="1138774"/>
+          </a:xfrm>
+          <a:solidFill>
+            <a:srgbClr val="F9FBFD"/>
+          </a:solidFill>
+          <a:effectLst>
+            <a:outerShdw blurRad="50800" dist="25400" dir="2700000" algn="tl" rotWithShape="0">
+              <a:schemeClr val="tx1">
+                <a:lumMod val="50000"/>
+                <a:lumOff val="50000"/>
+                <a:alpha val="20000"/>
+              </a:schemeClr>
+            </a:outerShdw>
+          </a:effectLst>
+        </p:grpSpPr>
+        <p:sp>
+          <p:nvSpPr>
+            <p:cNvPr id="19" name="ZoneTexte 18"/>
+            <p:cNvSpPr txBox="1"/>
+            <p:nvPr/>
+          </p:nvSpPr>
+          <p:spPr>
+            <a:xfrm>
+              <a:off x="683641" y="531254"/>
+              <a:ext cx="1701800" cy="1138773"/>
+            </a:xfrm>
+            <a:prstGeom prst="rect">
+              <a:avLst/>
+            </a:prstGeom>
+            <a:solidFill>
+              <a:srgbClr val="E7F7FD"/>
+            </a:solidFill>
+            <a:effectLst>
+              <a:outerShdw blurRad="50800" dist="38100" dir="2700000" sx="82000" sy="82000" algn="tl" rotWithShape="0">
+                <a:prstClr val="black">
+                  <a:alpha val="40000"/>
+                </a:prstClr>
+              </a:outerShdw>
+            </a:effectLst>
+          </p:spPr>
+          <p:txBody>
+            <a:bodyPr wrap="square" rtlCol="0">
+              <a:spAutoFit/>
+            </a:bodyPr>
+            <a:lstStyle/>
+            <a:p>
+              <a:pPr>
+                <a:spcAft>
+                  <a:spcPts val="600"/>
+                </a:spcAft>
+              </a:pPr>
+              <a:r>
+                <a:rPr lang="en-US" sz="1000" dirty="0">
+                  <a:latin typeface="Roboto Light" panose="02000000000000000000" pitchFamily="2" charset="0"/>
+                  <a:ea typeface="Roboto Light" panose="02000000000000000000" pitchFamily="2" charset="0"/>
+                </a:rPr>
+                <a:t>Study </a:t>
+              </a:r>
+              <a:r>
+                <a:rPr lang="en-US" sz="1000" dirty="0" smtClean="0">
+                  <a:latin typeface="Roboto Light" panose="02000000000000000000" pitchFamily="2" charset="0"/>
+                  <a:ea typeface="Roboto Light" panose="02000000000000000000" pitchFamily="2" charset="0"/>
+                </a:rPr>
+                <a:t>1 	            </a:t>
+              </a:r>
+              <a:r>
+                <a:rPr lang="en-US" sz="1000" i="1" dirty="0" smtClean="0">
+                  <a:solidFill>
+                    <a:schemeClr val="tx1">
+                      <a:lumMod val="75000"/>
+                      <a:lumOff val="25000"/>
+                    </a:schemeClr>
+                  </a:solidFill>
+                  <a:latin typeface="Roboto Light" panose="02000000000000000000" pitchFamily="2" charset="0"/>
+                  <a:ea typeface="Roboto Light" panose="02000000000000000000" pitchFamily="2" charset="0"/>
+                </a:rPr>
+                <a:t>EEG</a:t>
+              </a:r>
+              <a:endParaRPr lang="en-US" sz="1000" dirty="0" smtClean="0">
+                <a:solidFill>
+                  <a:schemeClr val="tx1">
+                    <a:lumMod val="75000"/>
+                    <a:lumOff val="25000"/>
+                  </a:schemeClr>
+                </a:solidFill>
+                <a:latin typeface="Roboto Light" panose="02000000000000000000" pitchFamily="2" charset="0"/>
+                <a:ea typeface="Roboto Light" panose="02000000000000000000" pitchFamily="2" charset="0"/>
+              </a:endParaRPr>
+            </a:p>
+            <a:p>
+              <a:pPr>
+                <a:spcAft>
+                  <a:spcPts val="300"/>
+                </a:spcAft>
+              </a:pPr>
+              <a:r>
+                <a:rPr lang="en-US" sz="1050" b="1" dirty="0" smtClean="0">
+                  <a:latin typeface="Helvetica Neue" panose="02000503000000020004" pitchFamily="50"/>
+                </a:rPr>
+                <a:t>DRF and arousals</a:t>
+              </a:r>
+              <a:endParaRPr lang="en-US" sz="1050" b="1" dirty="0">
+                <a:latin typeface="Helvetica Neue" panose="02000503000000020004" pitchFamily="50"/>
+              </a:endParaRPr>
+            </a:p>
+            <a:p>
+              <a:pPr algn="just"/>
+              <a:r>
+                <a:rPr lang="en-US" sz="1000" dirty="0">
+                  <a:latin typeface="Helvetica Neue" panose="02000503000000020004" pitchFamily="50"/>
+                </a:rPr>
+                <a:t>Are there </a:t>
+              </a:r>
+              <a:r>
+                <a:rPr lang="en-US" sz="1000" dirty="0" smtClean="0">
+                  <a:latin typeface="Helvetica Neue" panose="02000503000000020004" pitchFamily="50"/>
+                </a:rPr>
+                <a:t>differences in arousals between high and low dream recallers?</a:t>
+              </a:r>
+            </a:p>
+            <a:p>
+              <a:pPr algn="just"/>
+              <a:endParaRPr lang="en-US" sz="1000" dirty="0" smtClean="0">
+                <a:latin typeface="Helvetica Neue" panose="02000503000000020004" pitchFamily="50"/>
+              </a:endParaRPr>
+            </a:p>
+          </p:txBody>
+        </p:sp>
+        <p:sp>
+          <p:nvSpPr>
+            <p:cNvPr id="27" name="ZoneTexte 26"/>
+            <p:cNvSpPr txBox="1"/>
+            <p:nvPr/>
+          </p:nvSpPr>
+          <p:spPr>
+            <a:xfrm>
+              <a:off x="2470226" y="531253"/>
+              <a:ext cx="1701800" cy="1138773"/>
+            </a:xfrm>
+            <a:prstGeom prst="rect">
+              <a:avLst/>
+            </a:prstGeom>
+            <a:solidFill>
+              <a:srgbClr val="C7ECF9"/>
+            </a:solidFill>
+            <a:effectLst>
+              <a:outerShdw blurRad="50800" dist="38100" dir="2700000" sx="82000" sy="82000" algn="tl" rotWithShape="0">
+                <a:prstClr val="black">
+                  <a:alpha val="40000"/>
+                </a:prstClr>
+              </a:outerShdw>
+            </a:effectLst>
+          </p:spPr>
+          <p:txBody>
+            <a:bodyPr wrap="square" rtlCol="0">
+              <a:spAutoFit/>
+            </a:bodyPr>
+            <a:lstStyle/>
+            <a:p>
+              <a:pPr>
+                <a:spcAft>
+                  <a:spcPts val="600"/>
+                </a:spcAft>
+              </a:pPr>
+              <a:r>
+                <a:rPr lang="en-US" sz="1000" dirty="0">
+                  <a:latin typeface="Roboto Light" panose="02000000000000000000" pitchFamily="2" charset="0"/>
+                  <a:ea typeface="Roboto Light" panose="02000000000000000000" pitchFamily="2" charset="0"/>
+                </a:rPr>
+                <a:t>Study </a:t>
+              </a:r>
+              <a:r>
+                <a:rPr lang="en-US" sz="1000" dirty="0" smtClean="0">
+                  <a:latin typeface="Roboto Light" panose="02000000000000000000" pitchFamily="2" charset="0"/>
+                  <a:ea typeface="Roboto Light" panose="02000000000000000000" pitchFamily="2" charset="0"/>
+                </a:rPr>
+                <a:t>2	  </a:t>
+              </a:r>
+              <a:r>
+                <a:rPr lang="en-US" sz="1000" i="1" dirty="0" smtClean="0">
+                  <a:solidFill>
+                    <a:schemeClr val="tx1">
+                      <a:lumMod val="75000"/>
+                      <a:lumOff val="25000"/>
+                    </a:schemeClr>
+                  </a:solidFill>
+                  <a:latin typeface="Roboto Light" panose="02000000000000000000" pitchFamily="2" charset="0"/>
+                  <a:ea typeface="Roboto Light" panose="02000000000000000000" pitchFamily="2" charset="0"/>
+                </a:rPr>
+                <a:t>EEG-fMRI</a:t>
+              </a:r>
+            </a:p>
+            <a:p>
+              <a:pPr>
+                <a:spcAft>
+                  <a:spcPts val="300"/>
+                </a:spcAft>
+              </a:pPr>
+              <a:r>
+                <a:rPr lang="en-US" sz="1050" b="1" dirty="0" smtClean="0">
+                  <a:latin typeface="Helvetica Neue" panose="02000503000000020004" pitchFamily="50"/>
+                </a:rPr>
+                <a:t>DRF and sleep inertia</a:t>
+              </a:r>
+              <a:endParaRPr lang="en-US" sz="1050" b="1" dirty="0">
+                <a:latin typeface="Helvetica Neue" panose="02000503000000020004" pitchFamily="50"/>
+              </a:endParaRPr>
+            </a:p>
+            <a:p>
+              <a:pPr algn="just"/>
+              <a:r>
+                <a:rPr lang="en-US" sz="1000" dirty="0">
+                  <a:latin typeface="Helvetica Neue" panose="02000503000000020004" pitchFamily="50"/>
+                </a:rPr>
+                <a:t>Are there differences in sleep </a:t>
+              </a:r>
+              <a:r>
+                <a:rPr lang="en-US" sz="1000" dirty="0" smtClean="0">
+                  <a:latin typeface="Helvetica Neue" panose="02000503000000020004" pitchFamily="50"/>
+                </a:rPr>
+                <a:t>inertia between high and low dream recallers?</a:t>
+              </a:r>
+            </a:p>
+            <a:p>
+              <a:endParaRPr lang="en-US" sz="1000" dirty="0">
+                <a:latin typeface="Helvetica Neue" panose="02000503000000020004" pitchFamily="50"/>
+              </a:endParaRPr>
+            </a:p>
+          </p:txBody>
+        </p:sp>
+        <p:sp>
+          <p:nvSpPr>
+            <p:cNvPr id="36" name="ZoneTexte 35"/>
+            <p:cNvSpPr txBox="1"/>
+            <p:nvPr/>
+          </p:nvSpPr>
+          <p:spPr>
+            <a:xfrm>
+              <a:off x="4256811" y="531253"/>
+              <a:ext cx="1701800" cy="1138773"/>
+            </a:xfrm>
+            <a:prstGeom prst="rect">
+              <a:avLst/>
+            </a:prstGeom>
+            <a:solidFill>
+              <a:srgbClr val="9DDEF5"/>
+            </a:solidFill>
+            <a:effectLst>
+              <a:outerShdw blurRad="50800" dist="38100" dir="2700000" sx="82000" sy="82000" algn="tl" rotWithShape="0">
+                <a:prstClr val="black">
+                  <a:alpha val="40000"/>
+                </a:prstClr>
+              </a:outerShdw>
+            </a:effectLst>
+          </p:spPr>
+          <p:txBody>
+            <a:bodyPr wrap="square" rtlCol="0">
+              <a:spAutoFit/>
+            </a:bodyPr>
+            <a:lstStyle/>
+            <a:p>
+              <a:pPr>
+                <a:spcAft>
+                  <a:spcPts val="600"/>
+                </a:spcAft>
+              </a:pPr>
+              <a:r>
+                <a:rPr lang="en-US" sz="1000" dirty="0">
+                  <a:latin typeface="Roboto Light" panose="02000000000000000000" pitchFamily="2" charset="0"/>
+                  <a:ea typeface="Roboto Light" panose="02000000000000000000" pitchFamily="2" charset="0"/>
+                </a:rPr>
+                <a:t>Study </a:t>
+              </a:r>
+              <a:r>
+                <a:rPr lang="en-US" sz="1000" dirty="0" smtClean="0">
+                  <a:latin typeface="Roboto Light" panose="02000000000000000000" pitchFamily="2" charset="0"/>
+                  <a:ea typeface="Roboto Light" panose="02000000000000000000" pitchFamily="2" charset="0"/>
+                </a:rPr>
+                <a:t>3 	       </a:t>
+              </a:r>
+              <a:r>
+                <a:rPr lang="en-US" sz="1000" i="1" dirty="0" smtClean="0">
+                  <a:solidFill>
+                    <a:schemeClr val="tx1">
+                      <a:lumMod val="75000"/>
+                      <a:lumOff val="25000"/>
+                    </a:schemeClr>
+                  </a:solidFill>
+                  <a:latin typeface="Roboto Light" panose="02000000000000000000" pitchFamily="2" charset="0"/>
+                  <a:ea typeface="Roboto Light" panose="02000000000000000000" pitchFamily="2" charset="0"/>
+                </a:rPr>
+                <a:t>Survey</a:t>
+              </a:r>
+            </a:p>
+            <a:p>
+              <a:pPr>
+                <a:spcAft>
+                  <a:spcPts val="300"/>
+                </a:spcAft>
+              </a:pPr>
+              <a:r>
+                <a:rPr lang="en-US" sz="1050" b="1" dirty="0" smtClean="0">
+                  <a:latin typeface="Helvetica Neue" panose="02000503000000020004" pitchFamily="50"/>
+                </a:rPr>
+                <a:t>Sleep and dream habits</a:t>
+              </a:r>
+            </a:p>
+            <a:p>
+              <a:pPr algn="just">
+                <a:spcAft>
+                  <a:spcPts val="300"/>
+                </a:spcAft>
+              </a:pPr>
+              <a:r>
+                <a:rPr lang="en-US" sz="1000" dirty="0" smtClean="0">
+                  <a:latin typeface="Helvetica Neue" panose="02000503000000020004" pitchFamily="50"/>
+                </a:rPr>
+                <a:t>Survey of the sleep </a:t>
+              </a:r>
+              <a:r>
+                <a:rPr lang="en-US" sz="1000" dirty="0" smtClean="0">
+                  <a:latin typeface="Helvetica Neue" panose="02000503000000020004" pitchFamily="50"/>
+                </a:rPr>
+                <a:t>and dream habits of a large sample of </a:t>
+              </a:r>
+              <a:r>
+                <a:rPr lang="en-US" sz="1000" dirty="0" smtClean="0">
+                  <a:latin typeface="Helvetica Neue" panose="02000503000000020004" pitchFamily="50"/>
+                </a:rPr>
+                <a:t>French college students.</a:t>
+              </a:r>
+              <a:endParaRPr lang="en-US" sz="1000" dirty="0">
+                <a:latin typeface="Helvetica Neue" panose="02000503000000020004" pitchFamily="50"/>
+              </a:endParaRPr>
+            </a:p>
+          </p:txBody>
+        </p:sp>
+      </p:grpSp>
+      <p:sp>
+        <p:nvSpPr>
+          <p:cNvPr id="37" name="ZoneTexte 36"/>
+          <p:cNvSpPr txBox="1"/>
+          <p:nvPr/>
+        </p:nvSpPr>
+        <p:spPr>
+          <a:xfrm>
+            <a:off x="683640" y="1943752"/>
+            <a:ext cx="5274970" cy="1138773"/>
+          </a:xfrm>
+          <a:prstGeom prst="rect">
+            <a:avLst/>
+          </a:prstGeom>
+          <a:solidFill>
+            <a:srgbClr val="FFDCCD"/>
+          </a:solidFill>
+          <a:effectLst>
+            <a:outerShdw blurRad="50800" dist="25400" dir="2700000" algn="tl" rotWithShape="0">
+              <a:schemeClr val="tx1">
+                <a:lumMod val="50000"/>
+                <a:lumOff val="50000"/>
+                <a:alpha val="20000"/>
+              </a:schemeClr>
+            </a:outerShdw>
+          </a:effectLst>
+        </p:spPr>
+        <p:txBody>
+          <a:bodyPr wrap="square" rtlCol="0">
+            <a:spAutoFit/>
+          </a:bodyPr>
+          <a:lstStyle/>
+          <a:p>
+            <a:pPr>
+              <a:spcAft>
+                <a:spcPts val="600"/>
+              </a:spcAft>
+            </a:pPr>
+            <a:r>
+              <a:rPr lang="en-US" sz="1000" dirty="0">
+                <a:latin typeface="Roboto Light" panose="02000000000000000000" pitchFamily="2" charset="0"/>
+                <a:ea typeface="Roboto Light" panose="02000000000000000000" pitchFamily="2" charset="0"/>
+              </a:rPr>
+              <a:t>Study </a:t>
+            </a:r>
+            <a:r>
+              <a:rPr lang="en-US" sz="1000" dirty="0" smtClean="0">
+                <a:latin typeface="Roboto Light" panose="02000000000000000000" pitchFamily="2" charset="0"/>
+                <a:ea typeface="Roboto Light" panose="02000000000000000000" pitchFamily="2" charset="0"/>
+              </a:rPr>
+              <a:t>4			</a:t>
+            </a:r>
+            <a:r>
+              <a:rPr lang="en-US" sz="1000" dirty="0" smtClean="0">
+                <a:solidFill>
+                  <a:schemeClr val="tx1">
+                    <a:lumMod val="75000"/>
+                    <a:lumOff val="25000"/>
+                  </a:schemeClr>
+                </a:solidFill>
+                <a:latin typeface="Roboto Light" panose="02000000000000000000" pitchFamily="2" charset="0"/>
+                <a:ea typeface="Roboto Light" panose="02000000000000000000" pitchFamily="2" charset="0"/>
+              </a:rPr>
+              <a:t>  </a:t>
+            </a:r>
+            <a:r>
+              <a:rPr lang="en-US" sz="1000" dirty="0" smtClean="0">
+                <a:solidFill>
+                  <a:schemeClr val="tx1">
+                    <a:lumMod val="75000"/>
+                    <a:lumOff val="25000"/>
+                  </a:schemeClr>
+                </a:solidFill>
+                <a:latin typeface="Roboto Light" panose="02000000000000000000" pitchFamily="2" charset="0"/>
+                <a:ea typeface="Roboto Light" panose="02000000000000000000" pitchFamily="2" charset="0"/>
+              </a:rPr>
+              <a:t>		 </a:t>
+            </a:r>
+            <a:r>
+              <a:rPr lang="en-US" sz="1000" i="1" dirty="0" smtClean="0">
+                <a:solidFill>
+                  <a:schemeClr val="tx1">
+                    <a:lumMod val="75000"/>
+                    <a:lumOff val="25000"/>
+                  </a:schemeClr>
+                </a:solidFill>
+                <a:latin typeface="Roboto Light" panose="02000000000000000000" pitchFamily="2" charset="0"/>
+                <a:ea typeface="Roboto Light" panose="02000000000000000000" pitchFamily="2" charset="0"/>
+              </a:rPr>
+              <a:t>Behavior </a:t>
+            </a:r>
+            <a:r>
+              <a:rPr lang="en-US" sz="1000" dirty="0" smtClean="0">
+                <a:solidFill>
+                  <a:schemeClr val="tx1">
+                    <a:lumMod val="75000"/>
+                    <a:lumOff val="25000"/>
+                  </a:schemeClr>
+                </a:solidFill>
+                <a:latin typeface="Roboto Light" panose="02000000000000000000" pitchFamily="2" charset="0"/>
+                <a:ea typeface="Roboto Light" panose="02000000000000000000" pitchFamily="2" charset="0"/>
+              </a:rPr>
+              <a:t> </a:t>
+            </a:r>
+            <a:endParaRPr lang="en-US" sz="1000" dirty="0" smtClean="0">
+              <a:solidFill>
+                <a:schemeClr val="tx1">
+                  <a:lumMod val="75000"/>
+                  <a:lumOff val="25000"/>
+                </a:schemeClr>
+              </a:solidFill>
+              <a:latin typeface="Roboto Light" panose="02000000000000000000" pitchFamily="2" charset="0"/>
+              <a:ea typeface="Roboto Light" panose="02000000000000000000" pitchFamily="2" charset="0"/>
+            </a:endParaRPr>
+          </a:p>
+          <a:p>
+            <a:pPr>
+              <a:spcAft>
+                <a:spcPts val="300"/>
+              </a:spcAft>
+            </a:pPr>
+            <a:r>
+              <a:rPr lang="en-US" sz="1050" b="1" dirty="0" smtClean="0">
+                <a:latin typeface="Helvetica Neue" panose="02000503000000020004" pitchFamily="50"/>
+              </a:rPr>
+              <a:t>The memory sources of dreams</a:t>
+            </a:r>
+            <a:endParaRPr lang="en-US" sz="1050" b="1" dirty="0">
+              <a:latin typeface="Helvetica Neue" panose="02000503000000020004" pitchFamily="50"/>
+            </a:endParaRPr>
+          </a:p>
+          <a:p>
+            <a:pPr algn="just"/>
+            <a:r>
+              <a:rPr lang="en-US" sz="1000" dirty="0" smtClean="0">
+                <a:latin typeface="Helvetica Neue" panose="02000503000000020004" pitchFamily="50"/>
+              </a:rPr>
+              <a:t>Dream content is related to the waking life of the dreamer. Yet, the </a:t>
+            </a:r>
+            <a:r>
+              <a:rPr lang="en-US" sz="1000" dirty="0">
+                <a:latin typeface="Helvetica Neue" panose="02000503000000020004" pitchFamily="50"/>
+              </a:rPr>
+              <a:t>characteristics of the memory sources incorporated into dreams are still </a:t>
+            </a:r>
+            <a:r>
+              <a:rPr lang="en-US" sz="1000" dirty="0" smtClean="0">
+                <a:latin typeface="Helvetica Neue" panose="02000503000000020004" pitchFamily="50"/>
+              </a:rPr>
+              <a:t>unclear. We designed a new protocol to investigate remote and / or mundane memories that are hitherto relatively unexplored.</a:t>
+            </a:r>
+            <a:endParaRPr lang="en-US" sz="1000" dirty="0" smtClean="0">
+              <a:latin typeface="Helvetica Neue" panose="02000503000000020004" pitchFamily="50"/>
+            </a:endParaRPr>
+          </a:p>
+          <a:p>
+            <a:endParaRPr lang="en-US" sz="1000" dirty="0" smtClean="0">
+              <a:latin typeface="Helvetica Neue" panose="02000503000000020004" pitchFamily="50"/>
+            </a:endParaRPr>
+          </a:p>
+        </p:txBody>
+      </p:sp>
+      <p:cxnSp>
+        <p:nvCxnSpPr>
+          <p:cNvPr id="16" name="Connecteur droit 15"/>
+          <p:cNvCxnSpPr/>
+          <p:nvPr/>
+        </p:nvCxnSpPr>
+        <p:spPr>
+          <a:xfrm>
+            <a:off x="66054" y="1765530"/>
+            <a:ext cx="5940000" cy="0"/>
+          </a:xfrm>
+          <a:prstGeom prst="line">
+            <a:avLst/>
+          </a:prstGeom>
+          <a:ln w="12700">
+            <a:solidFill>
+              <a:srgbClr val="1D1F21"/>
+            </a:solidFill>
+            <a:prstDash val="sysDot"/>
+          </a:ln>
+        </p:spPr>
+        <p:style>
+          <a:lnRef idx="1">
+            <a:schemeClr val="dk1"/>
+          </a:lnRef>
+          <a:fillRef idx="0">
+            <a:schemeClr val="dk1"/>
+          </a:fillRef>
+          <a:effectRef idx="0">
+            <a:schemeClr val="dk1"/>
+          </a:effectRef>
+          <a:fontRef idx="minor">
+            <a:schemeClr val="tx1"/>
+          </a:fontRef>
+        </p:style>
+      </p:cxnSp>
+      <p:cxnSp>
+        <p:nvCxnSpPr>
+          <p:cNvPr id="24" name="Connecteur droit 23"/>
+          <p:cNvCxnSpPr/>
+          <p:nvPr/>
+        </p:nvCxnSpPr>
+        <p:spPr>
+          <a:xfrm>
+            <a:off x="66054" y="3260240"/>
+            <a:ext cx="5940000" cy="0"/>
+          </a:xfrm>
+          <a:prstGeom prst="line">
+            <a:avLst/>
+          </a:prstGeom>
+          <a:ln w="12700">
+            <a:solidFill>
+              <a:srgbClr val="1D1F21"/>
+            </a:solidFill>
+            <a:prstDash val="sysDot"/>
+          </a:ln>
+        </p:spPr>
+        <p:style>
+          <a:lnRef idx="1">
+            <a:schemeClr val="dk1"/>
+          </a:lnRef>
+          <a:fillRef idx="0">
+            <a:schemeClr val="dk1"/>
+          </a:fillRef>
+          <a:effectRef idx="0">
+            <a:schemeClr val="dk1"/>
+          </a:effectRef>
+          <a:fontRef idx="minor">
+            <a:schemeClr val="tx1"/>
+          </a:fontRef>
+        </p:style>
+      </p:cxnSp>
+    </p:spTree>
+    <p:extLst>
+      <p:ext uri="{BB962C8B-B14F-4D97-AF65-F5344CB8AC3E}">
+        <p14:creationId xmlns:p14="http://schemas.microsoft.com/office/powerpoint/2010/main" val="2133675662"/>
+      </p:ext>
+    </p:extLst>
+  </p:cSld>
+  <p:clrMapOvr>
+    <a:masterClrMapping/>
+  </p:clrMapOvr>
+  <p:timing>
+    <p:tnLst>
+      <p:par>
+        <p:cTn id="1" dur="indefinite" restart="never" nodeType="tmRoot"/>
+      </p:par>
+    </p:tnLst>
+  </p:timing>
+</p:sld>
+</file>
+
+<file path=ppt/slides/slide4.xml><?xml version="1.0" encoding="utf-8"?>
+<p:sld xmlns:a="http://schemas.openxmlformats.org/drawingml/2006/main" xmlns:r="http://schemas.openxmlformats.org/officeDocument/2006/relationships" xmlns:p="http://schemas.openxmlformats.org/presentationml/2006/main">
+  <p:cSld>
+    <p:spTree>
+      <p:nvGrpSpPr>
+        <p:cNvPr id="1" name=""/>
+        <p:cNvGrpSpPr/>
+        <p:nvPr/>
+      </p:nvGrpSpPr>
+      <p:grpSpPr>
+        <a:xfrm>
+          <a:off x="0" y="0"/>
+          <a:ext cx="0" cy="0"/>
+          <a:chOff x="0" y="0"/>
+          <a:chExt cx="0" cy="0"/>
+        </a:xfrm>
+      </p:grpSpPr>
+      <p:sp>
+        <p:nvSpPr>
+          <p:cNvPr id="8" name="ZoneTexte 7"/>
+          <p:cNvSpPr txBox="1"/>
+          <p:nvPr/>
+        </p:nvSpPr>
+        <p:spPr>
+          <a:xfrm>
+            <a:off x="67941" y="359348"/>
+            <a:ext cx="530915" cy="1332000"/>
+          </a:xfrm>
+          <a:prstGeom prst="rect">
+            <a:avLst/>
+          </a:prstGeom>
+          <a:noFill/>
+          <a:ln>
+            <a:noFill/>
+          </a:ln>
+        </p:spPr>
+        <p:txBody>
+          <a:bodyPr vert="vert270" wrap="square" rtlCol="0">
+            <a:spAutoFit/>
+          </a:bodyPr>
+          <a:lstStyle/>
+          <a:p>
+            <a:pPr algn="ctr">
+              <a:spcAft>
+                <a:spcPts val="300"/>
+              </a:spcAft>
+            </a:pPr>
+            <a:r>
+              <a:rPr lang="en-US" sz="1000" b="1" dirty="0">
+                <a:latin typeface="Helvetica Neue" panose="02000503000000020004" pitchFamily="50"/>
+              </a:rPr>
+              <a:t>DREAM RECALL </a:t>
+            </a:r>
+            <a:endParaRPr lang="en-US" sz="1000" b="1" dirty="0" smtClean="0">
+              <a:latin typeface="Helvetica Neue" panose="02000503000000020004" pitchFamily="50"/>
+            </a:endParaRPr>
+          </a:p>
+          <a:p>
+            <a:pPr algn="ctr">
+              <a:spcAft>
+                <a:spcPts val="300"/>
+              </a:spcAft>
+            </a:pPr>
+            <a:r>
+              <a:rPr lang="en-US" sz="1000" b="1" dirty="0" smtClean="0">
+                <a:latin typeface="Helvetica Neue" panose="02000503000000020004" pitchFamily="50"/>
+              </a:rPr>
+              <a:t>FREQUENCY</a:t>
+            </a:r>
+            <a:endParaRPr lang="en-US" sz="1000" b="1" dirty="0">
+              <a:latin typeface="Helvetica Neue" panose="02000503000000020004" pitchFamily="50"/>
+            </a:endParaRPr>
+          </a:p>
+        </p:txBody>
+      </p:sp>
+      <p:sp>
+        <p:nvSpPr>
+          <p:cNvPr id="20" name="ZoneTexte 19"/>
+          <p:cNvSpPr txBox="1"/>
+          <p:nvPr/>
+        </p:nvSpPr>
+        <p:spPr>
+          <a:xfrm>
+            <a:off x="67941" y="1847139"/>
+            <a:ext cx="530915" cy="1332000"/>
+          </a:xfrm>
+          <a:prstGeom prst="rect">
+            <a:avLst/>
+          </a:prstGeom>
+          <a:noFill/>
+          <a:ln>
+            <a:noFill/>
+          </a:ln>
+        </p:spPr>
+        <p:txBody>
+          <a:bodyPr vert="vert270" wrap="square" rtlCol="0">
+            <a:spAutoFit/>
+          </a:bodyPr>
+          <a:lstStyle/>
+          <a:p>
+            <a:pPr algn="ctr">
+              <a:spcAft>
+                <a:spcPts val="300"/>
+              </a:spcAft>
+            </a:pPr>
+            <a:r>
+              <a:rPr lang="en-US" sz="1000" b="1" dirty="0" smtClean="0">
+                <a:latin typeface="Helvetica Neue" panose="02000503000000020004" pitchFamily="50"/>
+              </a:rPr>
+              <a:t>DREAM </a:t>
+            </a:r>
+          </a:p>
+          <a:p>
+            <a:pPr algn="ctr">
+              <a:spcAft>
+                <a:spcPts val="300"/>
+              </a:spcAft>
+            </a:pPr>
+            <a:r>
+              <a:rPr lang="en-US" sz="1000" b="1" dirty="0" smtClean="0">
+                <a:latin typeface="Helvetica Neue" panose="02000503000000020004" pitchFamily="50"/>
+              </a:rPr>
+              <a:t>CONTENT</a:t>
+            </a:r>
+            <a:endParaRPr lang="en-US" sz="1000" b="1" dirty="0">
+              <a:latin typeface="Helvetica Neue" panose="02000503000000020004" pitchFamily="50"/>
+            </a:endParaRPr>
+          </a:p>
+        </p:txBody>
+      </p:sp>
+      <p:sp>
+        <p:nvSpPr>
+          <p:cNvPr id="22" name="ZoneTexte 21"/>
+          <p:cNvSpPr txBox="1"/>
+          <p:nvPr/>
+        </p:nvSpPr>
+        <p:spPr>
+          <a:xfrm>
+            <a:off x="66055" y="3338509"/>
+            <a:ext cx="532800" cy="1332000"/>
+          </a:xfrm>
+          <a:prstGeom prst="rect">
+            <a:avLst/>
+          </a:prstGeom>
+          <a:noFill/>
+          <a:ln>
+            <a:noFill/>
+          </a:ln>
+        </p:spPr>
+        <p:txBody>
+          <a:bodyPr vert="vert270" wrap="square" rtlCol="0">
+            <a:spAutoFit/>
+          </a:bodyPr>
+          <a:lstStyle/>
+          <a:p>
+            <a:pPr algn="ctr">
+              <a:spcAft>
+                <a:spcPts val="300"/>
+              </a:spcAft>
+            </a:pPr>
+            <a:r>
+              <a:rPr lang="en-US" sz="1000" b="1" dirty="0" smtClean="0">
+                <a:latin typeface="Helvetica Neue" panose="02000503000000020004" pitchFamily="50"/>
+              </a:rPr>
+              <a:t>SOFTWARE DEVELOPEMENT</a:t>
+            </a:r>
+            <a:endParaRPr lang="en-US" sz="1000" b="1" dirty="0">
+              <a:latin typeface="Helvetica Neue" panose="02000503000000020004" pitchFamily="50"/>
             </a:endParaRPr>
           </a:p>
         </p:txBody>
@@ -3831,849 +6731,6 @@
       </p:sp>
       <p:cxnSp>
         <p:nvCxnSpPr>
-          <p:cNvPr id="16" name="Connecteur droit 15"/>
-          <p:cNvCxnSpPr/>
-          <p:nvPr/>
-        </p:nvCxnSpPr>
-        <p:spPr>
-          <a:xfrm>
-            <a:off x="66054" y="1765530"/>
-            <a:ext cx="5940000" cy="0"/>
-          </a:xfrm>
-          <a:prstGeom prst="line">
-            <a:avLst/>
-          </a:prstGeom>
-          <a:ln w="12700">
-            <a:solidFill>
-              <a:srgbClr val="1D1F21"/>
-            </a:solidFill>
-            <a:prstDash val="sysDot"/>
-          </a:ln>
-        </p:spPr>
-        <p:style>
-          <a:lnRef idx="1">
-            <a:schemeClr val="dk1"/>
-          </a:lnRef>
-          <a:fillRef idx="0">
-            <a:schemeClr val="dk1"/>
-          </a:fillRef>
-          <a:effectRef idx="0">
-            <a:schemeClr val="dk1"/>
-          </a:effectRef>
-          <a:fontRef idx="minor">
-            <a:schemeClr val="tx1"/>
-          </a:fontRef>
-        </p:style>
-      </p:cxnSp>
-      <p:cxnSp>
-        <p:nvCxnSpPr>
-          <p:cNvPr id="24" name="Connecteur droit 23"/>
-          <p:cNvCxnSpPr/>
-          <p:nvPr/>
-        </p:nvCxnSpPr>
-        <p:spPr>
-          <a:xfrm>
-            <a:off x="66054" y="3260240"/>
-            <a:ext cx="5940000" cy="0"/>
-          </a:xfrm>
-          <a:prstGeom prst="line">
-            <a:avLst/>
-          </a:prstGeom>
-          <a:ln w="12700">
-            <a:solidFill>
-              <a:srgbClr val="1D1F21"/>
-            </a:solidFill>
-            <a:prstDash val="sysDot"/>
-          </a:ln>
-        </p:spPr>
-        <p:style>
-          <a:lnRef idx="1">
-            <a:schemeClr val="dk1"/>
-          </a:lnRef>
-          <a:fillRef idx="0">
-            <a:schemeClr val="dk1"/>
-          </a:fillRef>
-          <a:effectRef idx="0">
-            <a:schemeClr val="dk1"/>
-          </a:effectRef>
-          <a:fontRef idx="minor">
-            <a:schemeClr val="tx1"/>
-          </a:fontRef>
-        </p:style>
-      </p:cxnSp>
-    </p:spTree>
-    <p:extLst>
-      <p:ext uri="{BB962C8B-B14F-4D97-AF65-F5344CB8AC3E}">
-        <p14:creationId xmlns:p14="http://schemas.microsoft.com/office/powerpoint/2010/main" val="4203217391"/>
-      </p:ext>
-    </p:extLst>
-  </p:cSld>
-  <p:clrMapOvr>
-    <a:masterClrMapping/>
-  </p:clrMapOvr>
-  <p:timing>
-    <p:tnLst>
-      <p:par>
-        <p:cTn id="1" dur="indefinite" restart="never" nodeType="tmRoot"/>
-      </p:par>
-    </p:tnLst>
-  </p:timing>
-</p:sld>
-</file>
-
-<file path=ppt/slides/slide2.xml><?xml version="1.0" encoding="utf-8"?>
-<p:sld xmlns:a="http://schemas.openxmlformats.org/drawingml/2006/main" xmlns:r="http://schemas.openxmlformats.org/officeDocument/2006/relationships" xmlns:p="http://schemas.openxmlformats.org/presentationml/2006/main">
-  <p:cSld>
-    <p:spTree>
-      <p:nvGrpSpPr>
-        <p:cNvPr id="1" name=""/>
-        <p:cNvGrpSpPr/>
-        <p:nvPr/>
-      </p:nvGrpSpPr>
-      <p:grpSpPr>
-        <a:xfrm>
-          <a:off x="0" y="0"/>
-          <a:ext cx="0" cy="0"/>
-          <a:chOff x="0" y="0"/>
-          <a:chExt cx="0" cy="0"/>
-        </a:xfrm>
-      </p:grpSpPr>
-      <p:sp>
-        <p:nvSpPr>
-          <p:cNvPr id="8" name="ZoneTexte 7"/>
-          <p:cNvSpPr txBox="1"/>
-          <p:nvPr/>
-        </p:nvSpPr>
-        <p:spPr>
-          <a:xfrm>
-            <a:off x="67941" y="359348"/>
-            <a:ext cx="530915" cy="1332000"/>
-          </a:xfrm>
-          <a:prstGeom prst="rect">
-            <a:avLst/>
-          </a:prstGeom>
-          <a:noFill/>
-          <a:ln>
-            <a:noFill/>
-          </a:ln>
-        </p:spPr>
-        <p:txBody>
-          <a:bodyPr vert="vert270" wrap="square" rtlCol="0">
-            <a:spAutoFit/>
-          </a:bodyPr>
-          <a:lstStyle/>
-          <a:p>
-            <a:pPr algn="ctr">
-              <a:spcAft>
-                <a:spcPts val="300"/>
-              </a:spcAft>
-            </a:pPr>
-            <a:r>
-              <a:rPr lang="en-US" sz="1000" b="1" dirty="0">
-                <a:latin typeface="Helvetica Neue" panose="02000503000000020004" pitchFamily="50"/>
-              </a:rPr>
-              <a:t>DREAM RECALL </a:t>
-            </a:r>
-            <a:endParaRPr lang="en-US" sz="1000" b="1" dirty="0" smtClean="0">
-              <a:latin typeface="Helvetica Neue" panose="02000503000000020004" pitchFamily="50"/>
-            </a:endParaRPr>
-          </a:p>
-          <a:p>
-            <a:pPr algn="ctr">
-              <a:spcAft>
-                <a:spcPts val="300"/>
-              </a:spcAft>
-            </a:pPr>
-            <a:r>
-              <a:rPr lang="en-US" sz="1000" b="1" dirty="0" smtClean="0">
-                <a:latin typeface="Helvetica Neue" panose="02000503000000020004" pitchFamily="50"/>
-              </a:rPr>
-              <a:t>FREQUENCY</a:t>
-            </a:r>
-            <a:endParaRPr lang="en-US" sz="1000" b="1" dirty="0">
-              <a:latin typeface="Helvetica Neue" panose="02000503000000020004" pitchFamily="50"/>
-            </a:endParaRPr>
-          </a:p>
-        </p:txBody>
-      </p:sp>
-      <p:sp>
-        <p:nvSpPr>
-          <p:cNvPr id="20" name="ZoneTexte 19"/>
-          <p:cNvSpPr txBox="1"/>
-          <p:nvPr/>
-        </p:nvSpPr>
-        <p:spPr>
-          <a:xfrm>
-            <a:off x="67941" y="1847139"/>
-            <a:ext cx="530915" cy="1332000"/>
-          </a:xfrm>
-          <a:prstGeom prst="rect">
-            <a:avLst/>
-          </a:prstGeom>
-          <a:noFill/>
-          <a:ln>
-            <a:noFill/>
-          </a:ln>
-        </p:spPr>
-        <p:txBody>
-          <a:bodyPr vert="vert270" wrap="square" rtlCol="0">
-            <a:spAutoFit/>
-          </a:bodyPr>
-          <a:lstStyle/>
-          <a:p>
-            <a:pPr algn="ctr">
-              <a:spcAft>
-                <a:spcPts val="300"/>
-              </a:spcAft>
-            </a:pPr>
-            <a:r>
-              <a:rPr lang="en-US" sz="1000" b="1" dirty="0" smtClean="0">
-                <a:latin typeface="Helvetica Neue" panose="02000503000000020004" pitchFamily="50"/>
-              </a:rPr>
-              <a:t>DREAM </a:t>
-            </a:r>
-          </a:p>
-          <a:p>
-            <a:pPr algn="ctr">
-              <a:spcAft>
-                <a:spcPts val="300"/>
-              </a:spcAft>
-            </a:pPr>
-            <a:r>
-              <a:rPr lang="en-US" sz="1000" b="1" dirty="0" smtClean="0">
-                <a:latin typeface="Helvetica Neue" panose="02000503000000020004" pitchFamily="50"/>
-              </a:rPr>
-              <a:t>CONTENT</a:t>
-            </a:r>
-            <a:endParaRPr lang="en-US" sz="1000" b="1" dirty="0">
-              <a:latin typeface="Helvetica Neue" panose="02000503000000020004" pitchFamily="50"/>
-            </a:endParaRPr>
-          </a:p>
-        </p:txBody>
-      </p:sp>
-      <p:sp>
-        <p:nvSpPr>
-          <p:cNvPr id="22" name="ZoneTexte 21"/>
-          <p:cNvSpPr txBox="1"/>
-          <p:nvPr/>
-        </p:nvSpPr>
-        <p:spPr>
-          <a:xfrm>
-            <a:off x="66055" y="3338509"/>
-            <a:ext cx="532800" cy="1332000"/>
-          </a:xfrm>
-          <a:prstGeom prst="rect">
-            <a:avLst/>
-          </a:prstGeom>
-          <a:noFill/>
-          <a:ln>
-            <a:noFill/>
-          </a:ln>
-        </p:spPr>
-        <p:txBody>
-          <a:bodyPr vert="vert270" wrap="square" rtlCol="0">
-            <a:spAutoFit/>
-          </a:bodyPr>
-          <a:lstStyle/>
-          <a:p>
-            <a:pPr algn="ctr">
-              <a:spcAft>
-                <a:spcPts val="300"/>
-              </a:spcAft>
-            </a:pPr>
-            <a:r>
-              <a:rPr lang="en-US" sz="1000" b="1" dirty="0" smtClean="0">
-                <a:latin typeface="Helvetica Neue" panose="02000503000000020004" pitchFamily="50"/>
-              </a:rPr>
-              <a:t>SOFTWARE DEVELOPEMENT</a:t>
-            </a:r>
-            <a:endParaRPr lang="en-US" sz="1000" b="1" dirty="0">
-              <a:latin typeface="Helvetica Neue" panose="02000503000000020004" pitchFamily="50"/>
-            </a:endParaRPr>
-          </a:p>
-        </p:txBody>
-      </p:sp>
-      <p:sp>
-        <p:nvSpPr>
-          <p:cNvPr id="34" name="ZoneTexte 33"/>
-          <p:cNvSpPr txBox="1"/>
-          <p:nvPr/>
-        </p:nvSpPr>
-        <p:spPr>
-          <a:xfrm>
-            <a:off x="683641" y="3438969"/>
-            <a:ext cx="3488384" cy="1138773"/>
-          </a:xfrm>
-          <a:prstGeom prst="rect">
-            <a:avLst/>
-          </a:prstGeom>
-          <a:solidFill>
-            <a:srgbClr val="FFF6E7"/>
-          </a:solidFill>
-          <a:effectLst>
-            <a:outerShdw blurRad="50800" dist="25400" dir="2700000" algn="tl" rotWithShape="0">
-              <a:schemeClr val="tx1">
-                <a:lumMod val="50000"/>
-                <a:lumOff val="50000"/>
-                <a:alpha val="20000"/>
-              </a:schemeClr>
-            </a:outerShdw>
-          </a:effectLst>
-        </p:spPr>
-        <p:txBody>
-          <a:bodyPr wrap="square" rtlCol="0">
-            <a:spAutoFit/>
-          </a:bodyPr>
-          <a:lstStyle/>
-          <a:p>
-            <a:pPr>
-              <a:spcAft>
-                <a:spcPts val="600"/>
-              </a:spcAft>
-            </a:pPr>
-            <a:r>
-              <a:rPr lang="en-US" sz="1000" dirty="0">
-                <a:latin typeface="Roboto Light" panose="02000000000000000000" pitchFamily="2" charset="0"/>
-                <a:ea typeface="Roboto Light" panose="02000000000000000000" pitchFamily="2" charset="0"/>
-              </a:rPr>
-              <a:t>Study </a:t>
-            </a:r>
-            <a:r>
-              <a:rPr lang="en-US" sz="1000" dirty="0" smtClean="0">
-                <a:latin typeface="Roboto Light" panose="02000000000000000000" pitchFamily="2" charset="0"/>
-                <a:ea typeface="Roboto Light" panose="02000000000000000000" pitchFamily="2" charset="0"/>
-              </a:rPr>
-              <a:t>5		</a:t>
-            </a:r>
-            <a:r>
-              <a:rPr lang="en-US" sz="1000" dirty="0">
-                <a:solidFill>
-                  <a:schemeClr val="tx1">
-                    <a:lumMod val="75000"/>
-                    <a:lumOff val="25000"/>
-                  </a:schemeClr>
-                </a:solidFill>
-                <a:latin typeface="Roboto Light" panose="02000000000000000000" pitchFamily="2" charset="0"/>
-                <a:ea typeface="Roboto Light" panose="02000000000000000000" pitchFamily="2" charset="0"/>
-              </a:rPr>
-              <a:t> </a:t>
-            </a:r>
-            <a:r>
-              <a:rPr lang="en-US" sz="1000" dirty="0" smtClean="0">
-                <a:solidFill>
-                  <a:schemeClr val="tx1">
-                    <a:lumMod val="75000"/>
-                    <a:lumOff val="25000"/>
-                  </a:schemeClr>
-                </a:solidFill>
-                <a:latin typeface="Roboto Light" panose="02000000000000000000" pitchFamily="2" charset="0"/>
-                <a:ea typeface="Roboto Light" panose="02000000000000000000" pitchFamily="2" charset="0"/>
-              </a:rPr>
-              <a:t>                      </a:t>
-            </a:r>
-            <a:r>
-              <a:rPr lang="en-US" sz="1000" i="1" dirty="0" smtClean="0">
-                <a:solidFill>
-                  <a:schemeClr val="tx1">
-                    <a:lumMod val="75000"/>
-                    <a:lumOff val="25000"/>
-                  </a:schemeClr>
-                </a:solidFill>
-                <a:latin typeface="Roboto Light" panose="02000000000000000000" pitchFamily="2" charset="0"/>
-                <a:ea typeface="Roboto Light" panose="02000000000000000000" pitchFamily="2" charset="0"/>
-              </a:rPr>
-              <a:t>Programming</a:t>
-            </a:r>
-          </a:p>
-          <a:p>
-            <a:pPr>
-              <a:spcAft>
-                <a:spcPts val="300"/>
-              </a:spcAft>
-            </a:pPr>
-            <a:r>
-              <a:rPr lang="en-US" sz="1050" b="1" dirty="0" smtClean="0">
-                <a:latin typeface="Helvetica Neue" panose="02000503000000020004" pitchFamily="50"/>
-              </a:rPr>
-              <a:t>An open-source software for sleep data</a:t>
-            </a:r>
-            <a:endParaRPr lang="en-US" sz="1050" b="1" dirty="0">
-              <a:latin typeface="Helvetica Neue" panose="02000503000000020004" pitchFamily="50"/>
-            </a:endParaRPr>
-          </a:p>
-          <a:p>
-            <a:pPr algn="just"/>
-            <a:r>
-              <a:rPr lang="en-US" sz="1000" dirty="0" smtClean="0">
-                <a:latin typeface="Helvetica Neue" panose="02000503000000020004" pitchFamily="50"/>
-              </a:rPr>
-              <a:t>Development of an open-source Python software for visualizing, scoring and analyzing polysomnographic sleep data.</a:t>
-            </a:r>
-          </a:p>
-          <a:p>
-            <a:pPr algn="just"/>
-            <a:endParaRPr lang="en-US" sz="1000" dirty="0">
-              <a:latin typeface="Helvetica Neue" panose="02000503000000020004" pitchFamily="50"/>
-            </a:endParaRPr>
-          </a:p>
-        </p:txBody>
-      </p:sp>
-      <p:grpSp>
-        <p:nvGrpSpPr>
-          <p:cNvPr id="2" name="Groupe 1"/>
-          <p:cNvGrpSpPr/>
-          <p:nvPr/>
-        </p:nvGrpSpPr>
-        <p:grpSpPr>
-          <a:xfrm>
-            <a:off x="683640" y="459808"/>
-            <a:ext cx="5274970" cy="1138774"/>
-            <a:chOff x="683641" y="531253"/>
-            <a:chExt cx="5274970" cy="1138774"/>
-          </a:xfrm>
-          <a:solidFill>
-            <a:srgbClr val="F9FBFD"/>
-          </a:solidFill>
-          <a:effectLst>
-            <a:outerShdw blurRad="50800" dist="25400" dir="2700000" algn="tl" rotWithShape="0">
-              <a:schemeClr val="tx1">
-                <a:lumMod val="50000"/>
-                <a:lumOff val="50000"/>
-                <a:alpha val="20000"/>
-              </a:schemeClr>
-            </a:outerShdw>
-          </a:effectLst>
-        </p:grpSpPr>
-        <p:sp>
-          <p:nvSpPr>
-            <p:cNvPr id="19" name="ZoneTexte 18"/>
-            <p:cNvSpPr txBox="1"/>
-            <p:nvPr/>
-          </p:nvSpPr>
-          <p:spPr>
-            <a:xfrm>
-              <a:off x="683641" y="531254"/>
-              <a:ext cx="1701800" cy="1138773"/>
-            </a:xfrm>
-            <a:prstGeom prst="rect">
-              <a:avLst/>
-            </a:prstGeom>
-            <a:grpFill/>
-            <a:effectLst>
-              <a:outerShdw blurRad="50800" dist="38100" dir="2700000" sx="82000" sy="82000" algn="tl" rotWithShape="0">
-                <a:prstClr val="black">
-                  <a:alpha val="40000"/>
-                </a:prstClr>
-              </a:outerShdw>
-            </a:effectLst>
-          </p:spPr>
-          <p:txBody>
-            <a:bodyPr wrap="square" rtlCol="0">
-              <a:spAutoFit/>
-            </a:bodyPr>
-            <a:lstStyle/>
-            <a:p>
-              <a:pPr>
-                <a:spcAft>
-                  <a:spcPts val="600"/>
-                </a:spcAft>
-              </a:pPr>
-              <a:r>
-                <a:rPr lang="en-US" sz="1000" dirty="0">
-                  <a:latin typeface="Roboto Light" panose="02000000000000000000" pitchFamily="2" charset="0"/>
-                  <a:ea typeface="Roboto Light" panose="02000000000000000000" pitchFamily="2" charset="0"/>
-                </a:rPr>
-                <a:t>Study </a:t>
-              </a:r>
-              <a:r>
-                <a:rPr lang="en-US" sz="1000" dirty="0" smtClean="0">
-                  <a:latin typeface="Roboto Light" panose="02000000000000000000" pitchFamily="2" charset="0"/>
-                  <a:ea typeface="Roboto Light" panose="02000000000000000000" pitchFamily="2" charset="0"/>
-                </a:rPr>
-                <a:t>1 	            </a:t>
-              </a:r>
-              <a:r>
-                <a:rPr lang="en-US" sz="1000" i="1" dirty="0" smtClean="0">
-                  <a:solidFill>
-                    <a:schemeClr val="tx1">
-                      <a:lumMod val="75000"/>
-                      <a:lumOff val="25000"/>
-                    </a:schemeClr>
-                  </a:solidFill>
-                  <a:latin typeface="Roboto Light" panose="02000000000000000000" pitchFamily="2" charset="0"/>
-                  <a:ea typeface="Roboto Light" panose="02000000000000000000" pitchFamily="2" charset="0"/>
-                </a:rPr>
-                <a:t>EEG</a:t>
-              </a:r>
-              <a:endParaRPr lang="en-US" sz="1000" dirty="0" smtClean="0">
-                <a:solidFill>
-                  <a:schemeClr val="tx1">
-                    <a:lumMod val="75000"/>
-                    <a:lumOff val="25000"/>
-                  </a:schemeClr>
-                </a:solidFill>
-                <a:latin typeface="Roboto Light" panose="02000000000000000000" pitchFamily="2" charset="0"/>
-                <a:ea typeface="Roboto Light" panose="02000000000000000000" pitchFamily="2" charset="0"/>
-              </a:endParaRPr>
-            </a:p>
-            <a:p>
-              <a:pPr>
-                <a:spcAft>
-                  <a:spcPts val="300"/>
-                </a:spcAft>
-              </a:pPr>
-              <a:r>
-                <a:rPr lang="en-US" sz="1050" b="1" dirty="0" smtClean="0">
-                  <a:latin typeface="Helvetica Neue" panose="02000503000000020004" pitchFamily="50"/>
-                </a:rPr>
-                <a:t>DRF and arousals</a:t>
-              </a:r>
-              <a:endParaRPr lang="en-US" sz="1050" b="1" dirty="0">
-                <a:latin typeface="Helvetica Neue" panose="02000503000000020004" pitchFamily="50"/>
-              </a:endParaRPr>
-            </a:p>
-            <a:p>
-              <a:pPr algn="just"/>
-              <a:r>
-                <a:rPr lang="en-US" sz="1000" dirty="0">
-                  <a:latin typeface="Helvetica Neue" panose="02000503000000020004" pitchFamily="50"/>
-                </a:rPr>
-                <a:t>Are there </a:t>
-              </a:r>
-              <a:r>
-                <a:rPr lang="en-US" sz="1000" dirty="0" smtClean="0">
-                  <a:latin typeface="Helvetica Neue" panose="02000503000000020004" pitchFamily="50"/>
-                </a:rPr>
-                <a:t>differences in arousals between high and low dream recallers?</a:t>
-              </a:r>
-            </a:p>
-            <a:p>
-              <a:pPr algn="just"/>
-              <a:endParaRPr lang="en-US" sz="1000" dirty="0" smtClean="0">
-                <a:latin typeface="Helvetica Neue" panose="02000503000000020004" pitchFamily="50"/>
-              </a:endParaRPr>
-            </a:p>
-          </p:txBody>
-        </p:sp>
-        <p:sp>
-          <p:nvSpPr>
-            <p:cNvPr id="27" name="ZoneTexte 26"/>
-            <p:cNvSpPr txBox="1"/>
-            <p:nvPr/>
-          </p:nvSpPr>
-          <p:spPr>
-            <a:xfrm>
-              <a:off x="2470226" y="531253"/>
-              <a:ext cx="1701800" cy="1138773"/>
-            </a:xfrm>
-            <a:prstGeom prst="rect">
-              <a:avLst/>
-            </a:prstGeom>
-            <a:grpFill/>
-            <a:effectLst>
-              <a:outerShdw blurRad="50800" dist="38100" dir="2700000" sx="82000" sy="82000" algn="tl" rotWithShape="0">
-                <a:prstClr val="black">
-                  <a:alpha val="40000"/>
-                </a:prstClr>
-              </a:outerShdw>
-            </a:effectLst>
-          </p:spPr>
-          <p:txBody>
-            <a:bodyPr wrap="square" rtlCol="0">
-              <a:spAutoFit/>
-            </a:bodyPr>
-            <a:lstStyle/>
-            <a:p>
-              <a:pPr>
-                <a:spcAft>
-                  <a:spcPts val="600"/>
-                </a:spcAft>
-              </a:pPr>
-              <a:r>
-                <a:rPr lang="en-US" sz="1000" dirty="0">
-                  <a:latin typeface="Roboto Light" panose="02000000000000000000" pitchFamily="2" charset="0"/>
-                  <a:ea typeface="Roboto Light" panose="02000000000000000000" pitchFamily="2" charset="0"/>
-                </a:rPr>
-                <a:t>Study </a:t>
-              </a:r>
-              <a:r>
-                <a:rPr lang="en-US" sz="1000" dirty="0" smtClean="0">
-                  <a:latin typeface="Roboto Light" panose="02000000000000000000" pitchFamily="2" charset="0"/>
-                  <a:ea typeface="Roboto Light" panose="02000000000000000000" pitchFamily="2" charset="0"/>
-                </a:rPr>
-                <a:t>2	  </a:t>
-              </a:r>
-              <a:r>
-                <a:rPr lang="en-US" sz="1000" i="1" dirty="0" smtClean="0">
-                  <a:solidFill>
-                    <a:schemeClr val="tx1">
-                      <a:lumMod val="75000"/>
-                      <a:lumOff val="25000"/>
-                    </a:schemeClr>
-                  </a:solidFill>
-                  <a:latin typeface="Roboto Light" panose="02000000000000000000" pitchFamily="2" charset="0"/>
-                  <a:ea typeface="Roboto Light" panose="02000000000000000000" pitchFamily="2" charset="0"/>
-                </a:rPr>
-                <a:t>EEG-fMRI</a:t>
-              </a:r>
-            </a:p>
-            <a:p>
-              <a:pPr>
-                <a:spcAft>
-                  <a:spcPts val="300"/>
-                </a:spcAft>
-              </a:pPr>
-              <a:r>
-                <a:rPr lang="en-US" sz="1050" b="1" dirty="0" smtClean="0">
-                  <a:latin typeface="Helvetica Neue" panose="02000503000000020004" pitchFamily="50"/>
-                </a:rPr>
-                <a:t>DRF and sleep inertia</a:t>
-              </a:r>
-              <a:endParaRPr lang="en-US" sz="1050" b="1" dirty="0">
-                <a:latin typeface="Helvetica Neue" panose="02000503000000020004" pitchFamily="50"/>
-              </a:endParaRPr>
-            </a:p>
-            <a:p>
-              <a:pPr algn="just"/>
-              <a:r>
-                <a:rPr lang="en-US" sz="1000" dirty="0">
-                  <a:latin typeface="Helvetica Neue" panose="02000503000000020004" pitchFamily="50"/>
-                </a:rPr>
-                <a:t>Are there differences in sleep </a:t>
-              </a:r>
-              <a:r>
-                <a:rPr lang="en-US" sz="1000" dirty="0" smtClean="0">
-                  <a:latin typeface="Helvetica Neue" panose="02000503000000020004" pitchFamily="50"/>
-                </a:rPr>
-                <a:t>inertia between high and low dream recallers?</a:t>
-              </a:r>
-            </a:p>
-            <a:p>
-              <a:endParaRPr lang="en-US" sz="1000" dirty="0">
-                <a:latin typeface="Helvetica Neue" panose="02000503000000020004" pitchFamily="50"/>
-              </a:endParaRPr>
-            </a:p>
-          </p:txBody>
-        </p:sp>
-        <p:sp>
-          <p:nvSpPr>
-            <p:cNvPr id="36" name="ZoneTexte 35"/>
-            <p:cNvSpPr txBox="1"/>
-            <p:nvPr/>
-          </p:nvSpPr>
-          <p:spPr>
-            <a:xfrm>
-              <a:off x="4256811" y="531253"/>
-              <a:ext cx="1701800" cy="1138773"/>
-            </a:xfrm>
-            <a:prstGeom prst="rect">
-              <a:avLst/>
-            </a:prstGeom>
-            <a:grpFill/>
-            <a:effectLst>
-              <a:outerShdw blurRad="50800" dist="38100" dir="2700000" sx="82000" sy="82000" algn="tl" rotWithShape="0">
-                <a:prstClr val="black">
-                  <a:alpha val="40000"/>
-                </a:prstClr>
-              </a:outerShdw>
-            </a:effectLst>
-          </p:spPr>
-          <p:txBody>
-            <a:bodyPr wrap="square" rtlCol="0">
-              <a:spAutoFit/>
-            </a:bodyPr>
-            <a:lstStyle/>
-            <a:p>
-              <a:pPr>
-                <a:spcAft>
-                  <a:spcPts val="600"/>
-                </a:spcAft>
-              </a:pPr>
-              <a:r>
-                <a:rPr lang="en-US" sz="1000" dirty="0">
-                  <a:latin typeface="Roboto Light" panose="02000000000000000000" pitchFamily="2" charset="0"/>
-                  <a:ea typeface="Roboto Light" panose="02000000000000000000" pitchFamily="2" charset="0"/>
-                </a:rPr>
-                <a:t>Study </a:t>
-              </a:r>
-              <a:r>
-                <a:rPr lang="en-US" sz="1000" dirty="0" smtClean="0">
-                  <a:latin typeface="Roboto Light" panose="02000000000000000000" pitchFamily="2" charset="0"/>
-                  <a:ea typeface="Roboto Light" panose="02000000000000000000" pitchFamily="2" charset="0"/>
-                </a:rPr>
-                <a:t>3 	       </a:t>
-              </a:r>
-              <a:r>
-                <a:rPr lang="en-US" sz="1000" i="1" dirty="0" smtClean="0">
-                  <a:solidFill>
-                    <a:schemeClr val="tx1">
-                      <a:lumMod val="75000"/>
-                      <a:lumOff val="25000"/>
-                    </a:schemeClr>
-                  </a:solidFill>
-                  <a:latin typeface="Roboto Light" panose="02000000000000000000" pitchFamily="2" charset="0"/>
-                  <a:ea typeface="Roboto Light" panose="02000000000000000000" pitchFamily="2" charset="0"/>
-                </a:rPr>
-                <a:t>Survey</a:t>
-              </a:r>
-            </a:p>
-            <a:p>
-              <a:pPr>
-                <a:spcAft>
-                  <a:spcPts val="300"/>
-                </a:spcAft>
-              </a:pPr>
-              <a:r>
-                <a:rPr lang="en-US" sz="1050" b="1" dirty="0" smtClean="0">
-                  <a:latin typeface="Helvetica Neue" panose="02000503000000020004" pitchFamily="50"/>
-                </a:rPr>
-                <a:t>Sleep and dream habits</a:t>
-              </a:r>
-            </a:p>
-            <a:p>
-              <a:pPr algn="just">
-                <a:spcAft>
-                  <a:spcPts val="300"/>
-                </a:spcAft>
-              </a:pPr>
-              <a:r>
-                <a:rPr lang="en-US" sz="1000" dirty="0" smtClean="0">
-                  <a:latin typeface="Helvetica Neue" panose="02000503000000020004" pitchFamily="50"/>
-                </a:rPr>
-                <a:t>Survey of the sleep and dream habits of a large sample of French college students.</a:t>
-              </a:r>
-              <a:endParaRPr lang="en-US" sz="1000" dirty="0">
-                <a:latin typeface="Helvetica Neue" panose="02000503000000020004" pitchFamily="50"/>
-              </a:endParaRPr>
-            </a:p>
-          </p:txBody>
-        </p:sp>
-      </p:grpSp>
-      <p:sp>
-        <p:nvSpPr>
-          <p:cNvPr id="37" name="ZoneTexte 36"/>
-          <p:cNvSpPr txBox="1"/>
-          <p:nvPr/>
-        </p:nvSpPr>
-        <p:spPr>
-          <a:xfrm>
-            <a:off x="683640" y="1943752"/>
-            <a:ext cx="3488385" cy="1138773"/>
-          </a:xfrm>
-          <a:prstGeom prst="rect">
-            <a:avLst/>
-          </a:prstGeom>
-          <a:solidFill>
-            <a:srgbClr val="F8F6FA"/>
-          </a:solidFill>
-          <a:effectLst>
-            <a:outerShdw blurRad="50800" dist="25400" dir="2700000" algn="tl" rotWithShape="0">
-              <a:schemeClr val="tx1">
-                <a:lumMod val="50000"/>
-                <a:lumOff val="50000"/>
-                <a:alpha val="20000"/>
-              </a:schemeClr>
-            </a:outerShdw>
-          </a:effectLst>
-        </p:spPr>
-        <p:txBody>
-          <a:bodyPr wrap="square" rtlCol="0">
-            <a:spAutoFit/>
-          </a:bodyPr>
-          <a:lstStyle/>
-          <a:p>
-            <a:pPr>
-              <a:spcAft>
-                <a:spcPts val="600"/>
-              </a:spcAft>
-            </a:pPr>
-            <a:r>
-              <a:rPr lang="en-US" sz="1000" dirty="0">
-                <a:latin typeface="Roboto Light" panose="02000000000000000000" pitchFamily="2" charset="0"/>
-                <a:ea typeface="Roboto Light" panose="02000000000000000000" pitchFamily="2" charset="0"/>
-              </a:rPr>
-              <a:t>Study </a:t>
-            </a:r>
-            <a:r>
-              <a:rPr lang="en-US" sz="1000" dirty="0" smtClean="0">
-                <a:latin typeface="Roboto Light" panose="02000000000000000000" pitchFamily="2" charset="0"/>
-                <a:ea typeface="Roboto Light" panose="02000000000000000000" pitchFamily="2" charset="0"/>
-              </a:rPr>
-              <a:t>4			</a:t>
-            </a:r>
-            <a:r>
-              <a:rPr lang="en-US" sz="1000" dirty="0" smtClean="0">
-                <a:solidFill>
-                  <a:schemeClr val="tx1">
-                    <a:lumMod val="75000"/>
-                    <a:lumOff val="25000"/>
-                  </a:schemeClr>
-                </a:solidFill>
-                <a:latin typeface="Roboto Light" panose="02000000000000000000" pitchFamily="2" charset="0"/>
-                <a:ea typeface="Roboto Light" panose="02000000000000000000" pitchFamily="2" charset="0"/>
-              </a:rPr>
-              <a:t>  </a:t>
-            </a:r>
-            <a:r>
-              <a:rPr lang="en-US" sz="1000" i="1" dirty="0" smtClean="0">
-                <a:solidFill>
-                  <a:schemeClr val="tx1">
-                    <a:lumMod val="75000"/>
-                    <a:lumOff val="25000"/>
-                  </a:schemeClr>
-                </a:solidFill>
-                <a:latin typeface="Roboto Light" panose="02000000000000000000" pitchFamily="2" charset="0"/>
-                <a:ea typeface="Roboto Light" panose="02000000000000000000" pitchFamily="2" charset="0"/>
-              </a:rPr>
-              <a:t>Behavior </a:t>
-            </a:r>
-            <a:r>
-              <a:rPr lang="en-US" sz="1000" dirty="0" smtClean="0">
-                <a:solidFill>
-                  <a:schemeClr val="tx1">
-                    <a:lumMod val="75000"/>
-                    <a:lumOff val="25000"/>
-                  </a:schemeClr>
-                </a:solidFill>
-                <a:latin typeface="Roboto Light" panose="02000000000000000000" pitchFamily="2" charset="0"/>
-                <a:ea typeface="Roboto Light" panose="02000000000000000000" pitchFamily="2" charset="0"/>
-              </a:rPr>
-              <a:t> </a:t>
-            </a:r>
-          </a:p>
-          <a:p>
-            <a:pPr>
-              <a:spcAft>
-                <a:spcPts val="300"/>
-              </a:spcAft>
-            </a:pPr>
-            <a:r>
-              <a:rPr lang="en-US" sz="1050" b="1" dirty="0" smtClean="0">
-                <a:latin typeface="Helvetica Neue" panose="02000503000000020004" pitchFamily="50"/>
-              </a:rPr>
-              <a:t>The memory sources of dreams</a:t>
-            </a:r>
-            <a:endParaRPr lang="en-US" sz="1050" b="1" dirty="0">
-              <a:latin typeface="Helvetica Neue" panose="02000503000000020004" pitchFamily="50"/>
-            </a:endParaRPr>
-          </a:p>
-          <a:p>
-            <a:r>
-              <a:rPr lang="en-US" sz="1000" dirty="0" smtClean="0">
-                <a:latin typeface="Helvetica Neue" panose="02000503000000020004" pitchFamily="50"/>
-              </a:rPr>
-              <a:t>Investigation of the characteristics of the memory sources incorporated into dreams, especially remote and trivial memories.</a:t>
-            </a:r>
-          </a:p>
-          <a:p>
-            <a:endParaRPr lang="en-US" sz="1000" dirty="0" smtClean="0">
-              <a:latin typeface="Helvetica Neue" panose="02000503000000020004" pitchFamily="50"/>
-            </a:endParaRPr>
-          </a:p>
-        </p:txBody>
-      </p:sp>
-      <p:cxnSp>
-        <p:nvCxnSpPr>
           <p:cNvPr id="4" name="Connecteur droit 3"/>
           <p:cNvCxnSpPr/>
           <p:nvPr/>
@@ -4800,7 +6857,7 @@
 </file>
 
 <file path=ppt/theme/theme1.xml><?xml version="1.0" encoding="utf-8"?>
-<a:theme xmlns:a="http://schemas.openxmlformats.org/drawingml/2006/main" name="Thème Office">
+<a:theme xmlns:a="http://schemas.openxmlformats.org/drawingml/2006/main" name="Office Theme">
   <a:themeElements>
     <a:clrScheme name="Thème Office">
       <a:dk1>
@@ -4816,22 +6873,22 @@
         <a:srgbClr val="E7E6E6"/>
       </a:lt2>
       <a:accent1>
-        <a:srgbClr val="5B9BD5"/>
+        <a:srgbClr val="1D9A78"/>
       </a:accent1>
       <a:accent2>
-        <a:srgbClr val="ED7D31"/>
+        <a:srgbClr val="8BC145"/>
       </a:accent2>
       <a:accent3>
-        <a:srgbClr val="A5A5A5"/>
+        <a:srgbClr val="36AFCE"/>
       </a:accent3>
       <a:accent4>
-        <a:srgbClr val="FFC000"/>
+        <a:srgbClr val="1D6FA9"/>
       </a:accent4>
       <a:accent5>
-        <a:srgbClr val="4472C4"/>
+        <a:srgbClr val="B74919"/>
       </a:accent5>
       <a:accent6>
-        <a:srgbClr val="70AD47"/>
+        <a:srgbClr val="F19D19"/>
       </a:accent6>
       <a:hlink>
         <a:srgbClr val="0563C1"/>
@@ -5054,7 +7111,7 @@
   <a:extraClrSchemeLst/>
   <a:extLst>
     <a:ext uri="{05A4C25C-085E-4340-85A3-A5531E510DB2}">
-      <thm15:themeFamily xmlns:thm15="http://schemas.microsoft.com/office/thememl/2012/main" name="Office Theme" id="{62F939B6-93AF-4DB8-9C6B-D6C7DFDC589F}" vid="{4A3C46E8-61CC-4603-A589-7422A47A8E4A}"/>
+      <thm15:themeFamily xmlns:thm15="http://schemas.microsoft.com/office/thememl/2012/main" name="Office Theme" id="{62F939B6-93AF-4DB8-9C6B-D6C7DFDC589F}" vid="{AE6F2518-B084-4896-AF52-66CC2144AA26}"/>
     </a:ext>
   </a:extLst>
 </a:theme>

</xml_diff>